<commit_message>
Updated with Architecture Image
</commit_message>
<xml_diff>
--- a/Pycon-2016-Open-space.pptx
+++ b/Pycon-2016-Open-space.pptx
@@ -24,6 +24,7 @@
     <p:sldId id="271" r:id="rId19"/>
     <p:sldId id="272" r:id="rId20"/>
     <p:sldId id="273" r:id="rId21"/>
+    <p:sldId id="274" r:id="rId22"/>
   </p:sldIdLst>
   <p:sldSz cx="10080625" cy="7559675"/>
   <p:notesSz cx="7772400" cy="10058400"/>
@@ -2754,7 +2755,7 @@
         <p:spPr>
           <a:xfrm>
             <a:off x="529200" y="640080"/>
-            <a:ext cx="9068760" cy="1443240"/>
+            <a:ext cx="9068400" cy="1442880"/>
           </a:xfrm>
           <a:prstGeom prst="rect">
             <a:avLst/>
@@ -2791,7 +2792,7 @@
         <p:spPr>
           <a:xfrm>
             <a:off x="639720" y="4297680"/>
-            <a:ext cx="9068760" cy="1378440"/>
+            <a:ext cx="9068400" cy="1378080"/>
           </a:xfrm>
           <a:prstGeom prst="rect">
             <a:avLst/>
@@ -2864,7 +2865,7 @@
         <p:spPr>
           <a:xfrm>
             <a:off x="360" y="6766560"/>
-            <a:ext cx="10077120" cy="791280"/>
+            <a:ext cx="10076760" cy="790920"/>
           </a:xfrm>
           <a:prstGeom prst="rect">
             <a:avLst/>
@@ -2950,14 +2951,14 @@
       </p:grpSpPr>
       <p:sp>
         <p:nvSpPr>
-          <p:cNvPr id="91" name="CustomShape 1"/>
+          <p:cNvPr id="92" name="CustomShape 1"/>
           <p:cNvSpPr/>
           <p:nvPr/>
         </p:nvSpPr>
         <p:spPr>
           <a:xfrm>
-            <a:off x="503640" y="276480"/>
-            <a:ext cx="9070200" cy="1310400"/>
+            <a:off x="503640" y="301320"/>
+            <a:ext cx="9069840" cy="1260360"/>
           </a:xfrm>
           <a:prstGeom prst="rect">
             <a:avLst/>
@@ -2979,22 +2980,28 @@
               <a:rPr lang="en-US" sz="4000">
                 <a:latin typeface="Century Schoolbook L"/>
               </a:rPr>
-              <a:t>Spark Cluster Hyper parameter Tuning</a:t>
-            </a:r>
-            <a:endParaRPr/>
-          </a:p>
-        </p:txBody>
-      </p:sp>
-      <p:sp>
-        <p:nvSpPr>
-          <p:cNvPr id="92" name="CustomShape 2"/>
+              <a:t>Big Data Optimization: </a:t>
+            </a:r>
+            <a:r>
+              <a:rPr lang="en-US" sz="2800">
+                <a:latin typeface="Century Schoolbook L"/>
+              </a:rPr>
+              <a:t>Tune kafka Cluster</a:t>
+            </a:r>
+            <a:endParaRPr/>
+          </a:p>
+        </p:txBody>
+      </p:sp>
+      <p:sp>
+        <p:nvSpPr>
+          <p:cNvPr id="93" name="CustomShape 2"/>
           <p:cNvSpPr/>
           <p:nvPr/>
         </p:nvSpPr>
         <p:spPr>
           <a:xfrm>
             <a:off x="503640" y="1768680"/>
-            <a:ext cx="9070200" cy="5271120"/>
+            <a:ext cx="9069840" cy="4383000"/>
           </a:xfrm>
           <a:prstGeom prst="rect">
             <a:avLst/>
@@ -3016,172 +3023,241 @@
               <a:buChar char="l"/>
             </a:pPr>
             <a:r>
-              <a:rPr b="1" lang="en-US">
+              <a:rPr lang="en-US" sz="2000">
                 <a:latin typeface="Courier 10 Pitch"/>
               </a:rPr>
-              <a:t>1) ./spark-shell --conf</a:t>
-            </a:r>
-            <a:endParaRPr/>
-          </a:p>
-          <a:p>
-            <a:pPr>
-              <a:lnSpc>
-                <a:spcPct val="100000"/>
-              </a:lnSpc>
-              <a:buSzPct val="45000"/>
-              <a:buFont typeface="StarSymbol"/>
-              <a:buChar char="l"/>
-            </a:pPr>
-            <a:r>
-              <a:rPr lang="en-US">
+              <a:t>buffer.memory: default</a:t>
+            </a:r>
+            <a:endParaRPr/>
+          </a:p>
+          <a:p>
+            <a:pPr>
+              <a:lnSpc>
+                <a:spcPct val="100000"/>
+              </a:lnSpc>
+              <a:buSzPct val="45000"/>
+              <a:buFont typeface="StarSymbol"/>
+              <a:buChar char="l"/>
+            </a:pPr>
+            <a:r>
+              <a:rPr lang="en-US" sz="2000">
                 <a:latin typeface="Courier 10 Pitch"/>
               </a:rPr>
-              <a:t>--conf spark.executor.memory=50g</a:t>
-            </a:r>
-            <a:endParaRPr/>
-          </a:p>
-          <a:p>
-            <a:pPr>
-              <a:lnSpc>
-                <a:spcPct val="100000"/>
-              </a:lnSpc>
-              <a:buSzPct val="45000"/>
-              <a:buFont typeface="StarSymbol"/>
-              <a:buChar char="l"/>
-            </a:pPr>
-            <a:r>
-              <a:rPr lang="en-US">
+              <a:t>batch.size: "655357"</a:t>
+            </a:r>
+            <a:endParaRPr/>
+          </a:p>
+          <a:p>
+            <a:pPr>
+              <a:lnSpc>
+                <a:spcPct val="100000"/>
+              </a:lnSpc>
+              <a:buSzPct val="45000"/>
+              <a:buFont typeface="StarSymbol"/>
+              <a:buChar char="l"/>
+            </a:pPr>
+            <a:r>
+              <a:rPr lang="en-US" sz="2000">
                 <a:latin typeface="Courier 10 Pitch"/>
               </a:rPr>
-              <a:t>--conf spark.driver.memory=150g</a:t>
-            </a:r>
-            <a:endParaRPr/>
-          </a:p>
-          <a:p>
-            <a:pPr>
-              <a:lnSpc>
-                <a:spcPct val="100000"/>
-              </a:lnSpc>
-              <a:buSzPct val="45000"/>
-              <a:buFont typeface="StarSymbol"/>
-              <a:buChar char="l"/>
-            </a:pPr>
-            <a:r>
-              <a:rPr lang="en-US">
+              <a:t>linger.ms: "5"</a:t>
+            </a:r>
+            <a:endParaRPr/>
+          </a:p>
+          <a:p>
+            <a:pPr>
+              <a:lnSpc>
+                <a:spcPct val="100000"/>
+              </a:lnSpc>
+              <a:buSzPct val="45000"/>
+              <a:buFont typeface="StarSymbol"/>
+              <a:buChar char="l"/>
+            </a:pPr>
+            <a:r>
+              <a:rPr lang="en-US" sz="2000">
                 <a:latin typeface="Courier 10 Pitch"/>
               </a:rPr>
-              <a:t>--conf spark.kryoserializer.buffer.max=256 </a:t>
-            </a:r>
-            <a:endParaRPr/>
-          </a:p>
-          <a:p>
-            <a:pPr>
-              <a:lnSpc>
-                <a:spcPct val="100000"/>
-              </a:lnSpc>
-              <a:buSzPct val="45000"/>
-              <a:buFont typeface="StarSymbol"/>
-              <a:buChar char="l"/>
-            </a:pPr>
-            <a:r>
-              <a:rPr lang="en-US">
+              <a:t>compression.type: lz4</a:t>
+            </a:r>
+            <a:endParaRPr/>
+          </a:p>
+          <a:p>
+            <a:pPr>
+              <a:lnSpc>
+                <a:spcPct val="100000"/>
+              </a:lnSpc>
+              <a:buSzPct val="45000"/>
+              <a:buFont typeface="StarSymbol"/>
+              <a:buChar char="l"/>
+            </a:pPr>
+            <a:r>
+              <a:rPr lang="en-US" sz="2000">
                 <a:latin typeface="Courier 10 Pitch"/>
               </a:rPr>
-              <a:t>--conf spark.driver.maxResultSize=1g </a:t>
-            </a:r>
-            <a:endParaRPr/>
-          </a:p>
-          <a:p>
-            <a:pPr>
-              <a:lnSpc>
-                <a:spcPct val="100000"/>
-              </a:lnSpc>
-              <a:buSzPct val="45000"/>
-              <a:buFont typeface="StarSymbol"/>
-              <a:buChar char="l"/>
-            </a:pPr>
-            <a:r>
-              <a:rPr lang="en-US">
+              <a:t>retries: default</a:t>
+            </a:r>
+            <a:endParaRPr/>
+          </a:p>
+          <a:p>
+            <a:pPr>
+              <a:lnSpc>
+                <a:spcPct val="100000"/>
+              </a:lnSpc>
+              <a:buSzPct val="45000"/>
+              <a:buFont typeface="StarSymbol"/>
+              <a:buChar char="l"/>
+            </a:pPr>
+            <a:r>
+              <a:rPr lang="en-US" sz="2000">
                 <a:latin typeface="Courier 10 Pitch"/>
               </a:rPr>
-              <a:t>--conf spark.dynamicAllocation.enabled=true </a:t>
-            </a:r>
-            <a:endParaRPr/>
-          </a:p>
-          <a:p>
-            <a:pPr>
-              <a:lnSpc>
-                <a:spcPct val="100000"/>
-              </a:lnSpc>
-              <a:buSzPct val="45000"/>
-              <a:buFont typeface="StarSymbol"/>
-              <a:buChar char="l"/>
-            </a:pPr>
-            <a:r>
-              <a:rPr lang="en-US">
+              <a:t>send.buffer.bytes: default</a:t>
+            </a:r>
+            <a:endParaRPr/>
+          </a:p>
+          <a:p>
+            <a:pPr>
+              <a:lnSpc>
+                <a:spcPct val="100000"/>
+              </a:lnSpc>
+              <a:buSzPct val="45000"/>
+              <a:buFont typeface="StarSymbol"/>
+              <a:buChar char="l"/>
+            </a:pPr>
+            <a:r>
+              <a:rPr lang="en-US" sz="2000">
                 <a:latin typeface="Courier 10 Pitch"/>
               </a:rPr>
-              <a:t>--conf spark.shuffle.service.enabled=true </a:t>
-            </a:r>
-            <a:endParaRPr/>
-          </a:p>
-          <a:p>
-            <a:pPr>
-              <a:lnSpc>
-                <a:spcPct val="100000"/>
-              </a:lnSpc>
-              <a:buSzPct val="45000"/>
-              <a:buFont typeface="StarSymbol"/>
-              <a:buChar char="l"/>
-            </a:pPr>
-            <a:r>
-              <a:rPr lang="en-US">
+              <a:t>connections.max.idle.ms: default</a:t>
+            </a:r>
+            <a:endParaRPr/>
+          </a:p>
+          <a:p>
+            <a:pPr>
+              <a:lnSpc>
+                <a:spcPct val="100000"/>
+              </a:lnSpc>
+            </a:pPr>
+            <a:endParaRPr/>
+          </a:p>
+          <a:p>
+            <a:pPr>
+              <a:lnSpc>
+                <a:spcPct val="100000"/>
+              </a:lnSpc>
+              <a:buSzPct val="45000"/>
+              <a:buFont typeface="StarSymbol"/>
+              <a:buChar char="l"/>
+            </a:pPr>
+            <a:r>
+              <a:rPr lang="en-US" sz="2000">
+                <a:solidFill>
+                  <a:srgbClr val="3333ff"/>
+                </a:solidFill>
                 <a:latin typeface="Courier 10 Pitch"/>
               </a:rPr>
-              <a:t>--conf spark.rpc.askTimeout=300s </a:t>
-            </a:r>
-            <a:endParaRPr/>
-          </a:p>
-          <a:p>
-            <a:pPr>
-              <a:lnSpc>
-                <a:spcPct val="100000"/>
-              </a:lnSpc>
-              <a:buSzPct val="45000"/>
-              <a:buFont typeface="StarSymbol"/>
-              <a:buChar char="l"/>
-            </a:pPr>
-            <a:r>
-              <a:rPr lang="en-US">
+              <a:t>bootstrap.servers</a:t>
+            </a:r>
+            <a:endParaRPr/>
+          </a:p>
+          <a:p>
+            <a:pPr>
+              <a:lnSpc>
+                <a:spcPct val="100000"/>
+              </a:lnSpc>
+              <a:buSzPct val="45000"/>
+              <a:buFont typeface="StarSymbol"/>
+              <a:buChar char="l"/>
+            </a:pPr>
+            <a:r>
+              <a:rPr lang="en-US" sz="2000">
+                <a:solidFill>
+                  <a:srgbClr val="3333ff"/>
+                </a:solidFill>
                 <a:latin typeface="Courier 10 Pitch"/>
               </a:rPr>
-              <a:t>--conf spark.dynamicAllocation.minExecutors=5 </a:t>
-            </a:r>
-            <a:endParaRPr/>
-          </a:p>
-          <a:p>
-            <a:pPr>
-              <a:lnSpc>
-                <a:spcPct val="100000"/>
-              </a:lnSpc>
-              <a:buSzPct val="45000"/>
-              <a:buFont typeface="StarSymbol"/>
-              <a:buChar char="l"/>
-            </a:pPr>
-            <a:r>
-              <a:rPr lang="en-US">
+              <a:t>batch.size</a:t>
+            </a:r>
+            <a:endParaRPr/>
+          </a:p>
+          <a:p>
+            <a:pPr>
+              <a:lnSpc>
+                <a:spcPct val="100000"/>
+              </a:lnSpc>
+              <a:buSzPct val="45000"/>
+              <a:buFont typeface="StarSymbol"/>
+              <a:buChar char="l"/>
+            </a:pPr>
+            <a:r>
+              <a:rPr lang="en-US" sz="2000">
+                <a:solidFill>
+                  <a:srgbClr val="3333ff"/>
+                </a:solidFill>
                 <a:latin typeface="Courier 10 Pitch"/>
               </a:rPr>
-              <a:t>--conf spark.sql.shuffle.partitions=1024</a:t>
-            </a:r>
-            <a:endParaRPr/>
-          </a:p>
-          <a:p>
-            <a:pPr>
-              <a:lnSpc>
-                <a:spcPct val="100000"/>
-              </a:lnSpc>
-            </a:pPr>
+              <a:t>linger.ms</a:t>
+            </a:r>
+            <a:endParaRPr/>
+          </a:p>
+          <a:p>
+            <a:pPr>
+              <a:lnSpc>
+                <a:spcPct val="100000"/>
+              </a:lnSpc>
+              <a:buSzPct val="45000"/>
+              <a:buFont typeface="StarSymbol"/>
+              <a:buChar char="l"/>
+            </a:pPr>
+            <a:r>
+              <a:rPr lang="en-US" sz="2000">
+                <a:solidFill>
+                  <a:srgbClr val="3333ff"/>
+                </a:solidFill>
+                <a:latin typeface="Courier 10 Pitch"/>
+              </a:rPr>
+              <a:t>connections.max.idle.ms = 10000</a:t>
+            </a:r>
+            <a:endParaRPr/>
+          </a:p>
+          <a:p>
+            <a:pPr>
+              <a:lnSpc>
+                <a:spcPct val="100000"/>
+              </a:lnSpc>
+              <a:buSzPct val="45000"/>
+              <a:buFont typeface="StarSymbol"/>
+              <a:buChar char="l"/>
+            </a:pPr>
+            <a:r>
+              <a:rPr lang="en-US" sz="2000">
+                <a:solidFill>
+                  <a:srgbClr val="3333ff"/>
+                </a:solidFill>
+                <a:latin typeface="Courier 10 Pitch"/>
+              </a:rPr>
+              <a:t>compression.type</a:t>
+            </a:r>
+            <a:endParaRPr/>
+          </a:p>
+          <a:p>
+            <a:pPr>
+              <a:lnSpc>
+                <a:spcPct val="100000"/>
+              </a:lnSpc>
+              <a:buSzPct val="45000"/>
+              <a:buFont typeface="StarSymbol"/>
+              <a:buChar char="l"/>
+            </a:pPr>
+            <a:r>
+              <a:rPr lang="en-US" sz="2000">
+                <a:solidFill>
+                  <a:srgbClr val="3333ff"/>
+                </a:solidFill>
+                <a:latin typeface="Courier 10 Pitch"/>
+              </a:rPr>
+              <a:t>retries</a:t>
+            </a:r>
             <a:endParaRPr/>
           </a:p>
           <a:p>
@@ -3199,10 +3275,10 @@
   <p:timing>
     <p:tnLst>
       <p:par>
-        <p:cTn id="19" dur="indefinite" restart="never" nodeType="tmRoot">
+        <p:cTn id="17" dur="indefinite" restart="never" nodeType="tmRoot">
           <p:childTnLst>
             <p:seq>
-              <p:cTn id="20" nodeType="mainSeq"/>
+              <p:cTn id="18" nodeType="mainSeq"/>
               <p:prevCondLst>
                 <p:cond delay="0" evt="onPrev">
                   <p:tgtEl>
@@ -3245,14 +3321,14 @@
       </p:grpSpPr>
       <p:sp>
         <p:nvSpPr>
-          <p:cNvPr id="93" name="CustomShape 1"/>
+          <p:cNvPr id="94" name="CustomShape 1"/>
           <p:cNvSpPr/>
           <p:nvPr/>
         </p:nvSpPr>
         <p:spPr>
           <a:xfrm>
             <a:off x="503640" y="276480"/>
-            <a:ext cx="9070200" cy="1310400"/>
+            <a:ext cx="9069840" cy="1310040"/>
           </a:xfrm>
           <a:prstGeom prst="rect">
             <a:avLst/>
@@ -3282,14 +3358,14 @@
       </p:sp>
       <p:sp>
         <p:nvSpPr>
-          <p:cNvPr id="94" name="CustomShape 2"/>
+          <p:cNvPr id="95" name="CustomShape 2"/>
           <p:cNvSpPr/>
           <p:nvPr/>
         </p:nvSpPr>
         <p:spPr>
           <a:xfrm>
             <a:off x="503640" y="1768680"/>
-            <a:ext cx="9070200" cy="4383360"/>
+            <a:ext cx="9069840" cy="5270760"/>
           </a:xfrm>
           <a:prstGeom prst="rect">
             <a:avLst/>
@@ -3311,61 +3387,193 @@
               <a:buChar char="l"/>
             </a:pPr>
             <a:r>
+              <a:rPr b="1" lang="en-US">
+                <a:latin typeface="Courier 10 Pitch"/>
+              </a:rPr>
+              <a:t>1) ./spark-shell --conf</a:t>
+            </a:r>
+            <a:endParaRPr/>
+          </a:p>
+          <a:p>
+            <a:pPr>
+              <a:lnSpc>
+                <a:spcPct val="100000"/>
+              </a:lnSpc>
+              <a:buSzPct val="45000"/>
+              <a:buFont typeface="StarSymbol"/>
+              <a:buChar char="l"/>
+            </a:pPr>
+            <a:r>
               <a:rPr lang="en-US">
-                <a:latin typeface="Century Schoolbook L"/>
-              </a:rPr>
-              <a:t>2) Configuration in </a:t>
-            </a:r>
-            <a:r>
-              <a:rPr b="1" lang="en-US">
-                <a:latin typeface="Century Schoolbook L"/>
-              </a:rPr>
-              <a:t>spark-defaults.conf </a:t>
-            </a:r>
+                <a:latin typeface="Courier 10 Pitch"/>
+              </a:rPr>
+              <a:t>--conf spark.executor.memory=50g</a:t>
+            </a:r>
+            <a:endParaRPr/>
+          </a:p>
+          <a:p>
+            <a:pPr>
+              <a:lnSpc>
+                <a:spcPct val="100000"/>
+              </a:lnSpc>
+              <a:buSzPct val="45000"/>
+              <a:buFont typeface="StarSymbol"/>
+              <a:buChar char="l"/>
+            </a:pPr>
             <a:r>
               <a:rPr lang="en-US">
-                <a:latin typeface="Century Schoolbook L"/>
-              </a:rPr>
-              <a:t>at /usr/local/spark-1.6.1/conf</a:t>
-            </a:r>
-            <a:endParaRPr/>
-          </a:p>
-        </p:txBody>
-      </p:sp>
-      <p:pic>
-        <p:nvPicPr>
-          <p:cNvPr id="95" name="" descr=""/>
-          <p:cNvPicPr/>
-          <p:nvPr/>
-        </p:nvPicPr>
-        <p:blipFill>
-          <a:blip r:embed="rId1"/>
-          <a:stretch>
-            <a:fillRect/>
-          </a:stretch>
-        </p:blipFill>
-        <p:spPr>
-          <a:xfrm>
-            <a:off x="508320" y="2286000"/>
-            <a:ext cx="9091800" cy="5181480"/>
-          </a:xfrm>
-          <a:prstGeom prst="rect">
-            <a:avLst/>
-          </a:prstGeom>
-          <a:ln>
-            <a:noFill/>
-          </a:ln>
-        </p:spPr>
-      </p:pic>
+                <a:latin typeface="Courier 10 Pitch"/>
+              </a:rPr>
+              <a:t>--conf spark.driver.memory=150g</a:t>
+            </a:r>
+            <a:endParaRPr/>
+          </a:p>
+          <a:p>
+            <a:pPr>
+              <a:lnSpc>
+                <a:spcPct val="100000"/>
+              </a:lnSpc>
+              <a:buSzPct val="45000"/>
+              <a:buFont typeface="StarSymbol"/>
+              <a:buChar char="l"/>
+            </a:pPr>
+            <a:r>
+              <a:rPr lang="en-US">
+                <a:latin typeface="Courier 10 Pitch"/>
+              </a:rPr>
+              <a:t>--conf spark.kryoserializer.buffer.max=256 </a:t>
+            </a:r>
+            <a:endParaRPr/>
+          </a:p>
+          <a:p>
+            <a:pPr>
+              <a:lnSpc>
+                <a:spcPct val="100000"/>
+              </a:lnSpc>
+              <a:buSzPct val="45000"/>
+              <a:buFont typeface="StarSymbol"/>
+              <a:buChar char="l"/>
+            </a:pPr>
+            <a:r>
+              <a:rPr lang="en-US">
+                <a:latin typeface="Courier 10 Pitch"/>
+              </a:rPr>
+              <a:t>--conf spark.driver.maxResultSize=1g </a:t>
+            </a:r>
+            <a:endParaRPr/>
+          </a:p>
+          <a:p>
+            <a:pPr>
+              <a:lnSpc>
+                <a:spcPct val="100000"/>
+              </a:lnSpc>
+              <a:buSzPct val="45000"/>
+              <a:buFont typeface="StarSymbol"/>
+              <a:buChar char="l"/>
+            </a:pPr>
+            <a:r>
+              <a:rPr lang="en-US">
+                <a:latin typeface="Courier 10 Pitch"/>
+              </a:rPr>
+              <a:t>--conf spark.dynamicAllocation.enabled=true </a:t>
+            </a:r>
+            <a:endParaRPr/>
+          </a:p>
+          <a:p>
+            <a:pPr>
+              <a:lnSpc>
+                <a:spcPct val="100000"/>
+              </a:lnSpc>
+              <a:buSzPct val="45000"/>
+              <a:buFont typeface="StarSymbol"/>
+              <a:buChar char="l"/>
+            </a:pPr>
+            <a:r>
+              <a:rPr lang="en-US">
+                <a:latin typeface="Courier 10 Pitch"/>
+              </a:rPr>
+              <a:t>--conf spark.shuffle.service.enabled=true </a:t>
+            </a:r>
+            <a:endParaRPr/>
+          </a:p>
+          <a:p>
+            <a:pPr>
+              <a:lnSpc>
+                <a:spcPct val="100000"/>
+              </a:lnSpc>
+              <a:buSzPct val="45000"/>
+              <a:buFont typeface="StarSymbol"/>
+              <a:buChar char="l"/>
+            </a:pPr>
+            <a:r>
+              <a:rPr lang="en-US">
+                <a:latin typeface="Courier 10 Pitch"/>
+              </a:rPr>
+              <a:t>--conf spark.rpc.askTimeout=300s </a:t>
+            </a:r>
+            <a:endParaRPr/>
+          </a:p>
+          <a:p>
+            <a:pPr>
+              <a:lnSpc>
+                <a:spcPct val="100000"/>
+              </a:lnSpc>
+              <a:buSzPct val="45000"/>
+              <a:buFont typeface="StarSymbol"/>
+              <a:buChar char="l"/>
+            </a:pPr>
+            <a:r>
+              <a:rPr lang="en-US">
+                <a:latin typeface="Courier 10 Pitch"/>
+              </a:rPr>
+              <a:t>--conf spark.dynamicAllocation.minExecutors=5 </a:t>
+            </a:r>
+            <a:endParaRPr/>
+          </a:p>
+          <a:p>
+            <a:pPr>
+              <a:lnSpc>
+                <a:spcPct val="100000"/>
+              </a:lnSpc>
+              <a:buSzPct val="45000"/>
+              <a:buFont typeface="StarSymbol"/>
+              <a:buChar char="l"/>
+            </a:pPr>
+            <a:r>
+              <a:rPr lang="en-US">
+                <a:latin typeface="Courier 10 Pitch"/>
+              </a:rPr>
+              <a:t>--conf spark.sql.shuffle.partitions=1024</a:t>
+            </a:r>
+            <a:endParaRPr/>
+          </a:p>
+          <a:p>
+            <a:pPr>
+              <a:lnSpc>
+                <a:spcPct val="100000"/>
+              </a:lnSpc>
+            </a:pPr>
+            <a:endParaRPr/>
+          </a:p>
+          <a:p>
+            <a:pPr>
+              <a:lnSpc>
+                <a:spcPct val="100000"/>
+              </a:lnSpc>
+            </a:pPr>
+            <a:endParaRPr/>
+          </a:p>
+        </p:txBody>
+      </p:sp>
     </p:spTree>
   </p:cSld>
   <p:timing>
     <p:tnLst>
       <p:par>
-        <p:cTn id="21" dur="indefinite" restart="never" nodeType="tmRoot">
+        <p:cTn id="19" dur="indefinite" restart="never" nodeType="tmRoot">
           <p:childTnLst>
             <p:seq>
-              <p:cTn id="22" nodeType="mainSeq"/>
+              <p:cTn id="20" nodeType="mainSeq"/>
               <p:prevCondLst>
                 <p:cond delay="0" evt="onPrev">
                   <p:tgtEl>
@@ -3415,7 +3623,7 @@
         <p:spPr>
           <a:xfrm>
             <a:off x="503640" y="276480"/>
-            <a:ext cx="9070200" cy="1310400"/>
+            <a:ext cx="9069840" cy="1310040"/>
           </a:xfrm>
           <a:prstGeom prst="rect">
             <a:avLst/>
@@ -3452,7 +3660,7 @@
         <p:spPr>
           <a:xfrm>
             <a:off x="503640" y="1768680"/>
-            <a:ext cx="9070200" cy="4383360"/>
+            <a:ext cx="9069840" cy="4383000"/>
           </a:xfrm>
           <a:prstGeom prst="rect">
             <a:avLst/>
@@ -3475,114 +3683,60 @@
             </a:pPr>
             <a:r>
               <a:rPr lang="en-US">
-                <a:latin typeface="Courier 10 Pitch"/>
-              </a:rPr>
-              <a:t>spark.master                     spark://master.prod.chetan.com:7077</a:t>
-            </a:r>
-            <a:endParaRPr/>
-          </a:p>
-          <a:p>
-            <a:pPr>
-              <a:lnSpc>
-                <a:spcPct val="100000"/>
-              </a:lnSpc>
-              <a:buSzPct val="45000"/>
-              <a:buFont typeface="StarSymbol"/>
-              <a:buChar char="l"/>
-            </a:pPr>
+                <a:latin typeface="Century Schoolbook L"/>
+              </a:rPr>
+              <a:t>2) Configuration in </a:t>
+            </a:r>
+            <a:r>
+              <a:rPr b="1" lang="en-US">
+                <a:latin typeface="Century Schoolbook L"/>
+              </a:rPr>
+              <a:t>spark-defaults.conf </a:t>
+            </a:r>
             <a:r>
               <a:rPr lang="en-US">
-                <a:latin typeface="Courier 10 Pitch"/>
-              </a:rPr>
-              <a:t>spark.serializer                 org.apache.spark.serializer.KryoSerializer</a:t>
-            </a:r>
-            <a:endParaRPr/>
-          </a:p>
-          <a:p>
-            <a:pPr>
-              <a:lnSpc>
-                <a:spcPct val="100000"/>
-              </a:lnSpc>
-              <a:buSzPct val="45000"/>
-              <a:buFont typeface="StarSymbol"/>
-              <a:buChar char="l"/>
-            </a:pPr>
-            <a:r>
-              <a:rPr lang="en-US">
-                <a:latin typeface="Courier 10 Pitch"/>
-              </a:rPr>
-              <a:t>spark.eventLog.enabled           true</a:t>
-            </a:r>
-            <a:endParaRPr/>
-          </a:p>
-          <a:p>
-            <a:pPr>
-              <a:lnSpc>
-                <a:spcPct val="100000"/>
-              </a:lnSpc>
-              <a:buSzPct val="45000"/>
-              <a:buFont typeface="StarSymbol"/>
-              <a:buChar char="l"/>
-            </a:pPr>
-            <a:r>
-              <a:rPr lang="en-US">
-                <a:latin typeface="Courier 10 Pitch"/>
-              </a:rPr>
-              <a:t>spark.history.fs.logDirectory    file:/data/tmp/spark-events</a:t>
-            </a:r>
-            <a:endParaRPr/>
-          </a:p>
-          <a:p>
-            <a:pPr>
-              <a:lnSpc>
-                <a:spcPct val="100000"/>
-              </a:lnSpc>
-              <a:buSzPct val="45000"/>
-              <a:buFont typeface="StarSymbol"/>
-              <a:buChar char="l"/>
-            </a:pPr>
-            <a:r>
-              <a:rPr lang="en-US">
-                <a:solidFill>
-                  <a:srgbClr val="3333ff"/>
-                </a:solidFill>
-                <a:latin typeface="Courier 10 Pitch"/>
-              </a:rPr>
-              <a:t>#spark.eventLog.dir=hdfs://namenode_host:namenode_port/user/spark/applicationHistory4</a:t>
-            </a:r>
-            <a:endParaRPr/>
-          </a:p>
-          <a:p>
-            <a:pPr>
-              <a:lnSpc>
-                <a:spcPct val="100000"/>
-              </a:lnSpc>
-              <a:buSzPct val="45000"/>
-              <a:buFont typeface="StarSymbol"/>
-              <a:buChar char="l"/>
-            </a:pPr>
-            <a:r>
-              <a:rPr lang="en-US">
-                <a:solidFill>
-                  <a:srgbClr val="3333ff"/>
-                </a:solidFill>
-                <a:latin typeface="Courier 10 Pitch"/>
-              </a:rPr>
-              <a:t>spark.eventLog.dir file:/data/tmp/spark-events</a:t>
-            </a:r>
-            <a:endParaRPr/>
-          </a:p>
-        </p:txBody>
-      </p:sp>
+                <a:latin typeface="Century Schoolbook L"/>
+              </a:rPr>
+              <a:t>at /usr/local/spark-1.6.1/conf</a:t>
+            </a:r>
+            <a:endParaRPr/>
+          </a:p>
+        </p:txBody>
+      </p:sp>
+      <p:pic>
+        <p:nvPicPr>
+          <p:cNvPr id="98" name="" descr=""/>
+          <p:cNvPicPr/>
+          <p:nvPr/>
+        </p:nvPicPr>
+        <p:blipFill>
+          <a:blip r:embed="rId1"/>
+          <a:stretch>
+            <a:fillRect/>
+          </a:stretch>
+        </p:blipFill>
+        <p:spPr>
+          <a:xfrm>
+            <a:off x="508320" y="2286000"/>
+            <a:ext cx="9091440" cy="5181120"/>
+          </a:xfrm>
+          <a:prstGeom prst="rect">
+            <a:avLst/>
+          </a:prstGeom>
+          <a:ln>
+            <a:noFill/>
+          </a:ln>
+        </p:spPr>
+      </p:pic>
     </p:spTree>
   </p:cSld>
   <p:timing>
     <p:tnLst>
       <p:par>
-        <p:cTn id="23" dur="indefinite" restart="never" nodeType="tmRoot">
+        <p:cTn id="21" dur="indefinite" restart="never" nodeType="tmRoot">
           <p:childTnLst>
             <p:seq>
-              <p:cTn id="24" nodeType="mainSeq"/>
+              <p:cTn id="22" nodeType="mainSeq"/>
               <p:prevCondLst>
                 <p:cond delay="0" evt="onPrev">
                   <p:tgtEl>
@@ -3625,14 +3779,14 @@
       </p:grpSpPr>
       <p:sp>
         <p:nvSpPr>
-          <p:cNvPr id="98" name="CustomShape 1"/>
+          <p:cNvPr id="99" name="CustomShape 1"/>
           <p:cNvSpPr/>
           <p:nvPr/>
         </p:nvSpPr>
         <p:spPr>
           <a:xfrm>
-            <a:off x="503640" y="301320"/>
-            <a:ext cx="9070200" cy="1260720"/>
+            <a:off x="503640" y="276480"/>
+            <a:ext cx="9069840" cy="1310040"/>
           </a:xfrm>
           <a:prstGeom prst="rect">
             <a:avLst/>
@@ -3642,17 +3796,34 @@
             <a:noFill/>
           </a:ln>
         </p:spPr>
-      </p:sp>
-      <p:sp>
-        <p:nvSpPr>
-          <p:cNvPr id="99" name="CustomShape 2"/>
+        <p:txBody>
+          <a:bodyPr lIns="0" rIns="0" tIns="0" bIns="0" anchor="ctr"/>
+          <a:p>
+            <a:pPr algn="ctr">
+              <a:lnSpc>
+                <a:spcPct val="100000"/>
+              </a:lnSpc>
+            </a:pPr>
+            <a:r>
+              <a:rPr lang="en-US" sz="4000">
+                <a:latin typeface="Century Schoolbook L"/>
+              </a:rPr>
+              <a:t>Spark Cluster Hyper parameter Tuning</a:t>
+            </a:r>
+            <a:endParaRPr/>
+          </a:p>
+        </p:txBody>
+      </p:sp>
+      <p:sp>
+        <p:nvSpPr>
+          <p:cNvPr id="100" name="CustomShape 2"/>
           <p:cNvSpPr/>
           <p:nvPr/>
         </p:nvSpPr>
         <p:spPr>
           <a:xfrm>
             <a:off x="503640" y="1768680"/>
-            <a:ext cx="9070200" cy="4383360"/>
+            <a:ext cx="9069840" cy="4383000"/>
           </a:xfrm>
           <a:prstGeom prst="rect">
             <a:avLst/>
@@ -3665,35 +3836,110 @@
         <p:txBody>
           <a:bodyPr lIns="0" rIns="0" tIns="0" bIns="0"/>
           <a:p>
-            <a:pPr algn="ctr">
-              <a:lnSpc>
-                <a:spcPct val="100000"/>
-              </a:lnSpc>
-            </a:pPr>
-            <a:endParaRPr/>
-          </a:p>
-          <a:p>
-            <a:pPr algn="ctr">
-              <a:lnSpc>
-                <a:spcPct val="100000"/>
-              </a:lnSpc>
-            </a:pPr>
-            <a:endParaRPr/>
-          </a:p>
-          <a:p>
-            <a:pPr algn="ctr">
-              <a:lnSpc>
-                <a:spcPct val="100000"/>
-              </a:lnSpc>
-              <a:buSzPct val="45000"/>
-              <a:buFont typeface="StarSymbol"/>
-              <a:buChar char="l"/>
-            </a:pPr>
-            <a:r>
-              <a:rPr lang="en-US" sz="4400">
-                <a:latin typeface="Century Schoolbook L"/>
-              </a:rPr>
-              <a:t>PySpark with Hadoop Demo</a:t>
+            <a:pPr>
+              <a:lnSpc>
+                <a:spcPct val="100000"/>
+              </a:lnSpc>
+              <a:buSzPct val="45000"/>
+              <a:buFont typeface="StarSymbol"/>
+              <a:buChar char="l"/>
+            </a:pPr>
+            <a:r>
+              <a:rPr lang="en-US">
+                <a:latin typeface="Courier 10 Pitch"/>
+              </a:rPr>
+              <a:t>spark.master                     spark://master.prod.chetan.com:7077</a:t>
+            </a:r>
+            <a:endParaRPr/>
+          </a:p>
+          <a:p>
+            <a:pPr>
+              <a:lnSpc>
+                <a:spcPct val="100000"/>
+              </a:lnSpc>
+              <a:buSzPct val="45000"/>
+              <a:buFont typeface="StarSymbol"/>
+              <a:buChar char="l"/>
+            </a:pPr>
+            <a:r>
+              <a:rPr lang="en-US">
+                <a:latin typeface="Courier 10 Pitch"/>
+              </a:rPr>
+              <a:t>spark.serializer                 org.apache.spark.serializer.KryoSerializer</a:t>
+            </a:r>
+            <a:endParaRPr/>
+          </a:p>
+          <a:p>
+            <a:pPr>
+              <a:lnSpc>
+                <a:spcPct val="100000"/>
+              </a:lnSpc>
+              <a:buSzPct val="45000"/>
+              <a:buFont typeface="StarSymbol"/>
+              <a:buChar char="l"/>
+            </a:pPr>
+            <a:r>
+              <a:rPr lang="en-US">
+                <a:latin typeface="Courier 10 Pitch"/>
+              </a:rPr>
+              <a:t>spark.eventLog.enabled           true</a:t>
+            </a:r>
+            <a:endParaRPr/>
+          </a:p>
+          <a:p>
+            <a:pPr>
+              <a:lnSpc>
+                <a:spcPct val="100000"/>
+              </a:lnSpc>
+              <a:buSzPct val="45000"/>
+              <a:buFont typeface="StarSymbol"/>
+              <a:buChar char="l"/>
+            </a:pPr>
+            <a:r>
+              <a:rPr lang="en-US">
+                <a:latin typeface="Courier 10 Pitch"/>
+              </a:rPr>
+              <a:t>spark.history.fs.logDirectory    file:/data/tmp/spark-events</a:t>
+            </a:r>
+            <a:endParaRPr/>
+          </a:p>
+          <a:p>
+            <a:pPr>
+              <a:lnSpc>
+                <a:spcPct val="100000"/>
+              </a:lnSpc>
+              <a:buSzPct val="45000"/>
+              <a:buFont typeface="StarSymbol"/>
+              <a:buChar char="l"/>
+            </a:pPr>
+            <a:r>
+              <a:rPr lang="en-US">
+                <a:solidFill>
+                  <a:srgbClr val="3333ff"/>
+                </a:solidFill>
+                <a:latin typeface="Courier 10 Pitch"/>
+              </a:rPr>
+              <a:t>#spark.eventLog.dir=hdfs://namenode_host:namenode_port/user/spark/applicationHistory4</a:t>
+            </a:r>
+            <a:endParaRPr/>
+          </a:p>
+          <a:p>
+            <a:pPr>
+              <a:lnSpc>
+                <a:spcPct val="100000"/>
+              </a:lnSpc>
+              <a:buSzPct val="45000"/>
+              <a:buFont typeface="StarSymbol"/>
+              <a:buChar char="l"/>
+            </a:pPr>
+            <a:r>
+              <a:rPr lang="en-US">
+                <a:solidFill>
+                  <a:srgbClr val="3333ff"/>
+                </a:solidFill>
+                <a:latin typeface="Courier 10 Pitch"/>
+              </a:rPr>
+              <a:t>spark.eventLog.dir file:/data/tmp/spark-events</a:t>
             </a:r>
             <a:endParaRPr/>
           </a:p>
@@ -3704,10 +3950,10 @@
   <p:timing>
     <p:tnLst>
       <p:par>
-        <p:cTn id="25" dur="indefinite" restart="never" nodeType="tmRoot">
+        <p:cTn id="23" dur="indefinite" restart="never" nodeType="tmRoot">
           <p:childTnLst>
             <p:seq>
-              <p:cTn id="26" nodeType="mainSeq"/>
+              <p:cTn id="24" nodeType="mainSeq"/>
               <p:prevCondLst>
                 <p:cond delay="0" evt="onPrev">
                   <p:tgtEl>
@@ -3750,14 +3996,14 @@
       </p:grpSpPr>
       <p:sp>
         <p:nvSpPr>
-          <p:cNvPr id="100" name="CustomShape 1"/>
+          <p:cNvPr id="101" name="CustomShape 1"/>
           <p:cNvSpPr/>
           <p:nvPr/>
         </p:nvSpPr>
         <p:spPr>
           <a:xfrm>
             <a:off x="503640" y="301320"/>
-            <a:ext cx="9070200" cy="1260720"/>
+            <a:ext cx="9069840" cy="1260360"/>
           </a:xfrm>
           <a:prstGeom prst="rect">
             <a:avLst/>
@@ -3767,34 +4013,17 @@
             <a:noFill/>
           </a:ln>
         </p:spPr>
-        <p:txBody>
-          <a:bodyPr lIns="0" rIns="0" tIns="0" bIns="0" anchor="ctr"/>
-          <a:p>
-            <a:pPr algn="ctr">
-              <a:lnSpc>
-                <a:spcPct val="100000"/>
-              </a:lnSpc>
-            </a:pPr>
-            <a:r>
-              <a:rPr lang="en-US" sz="3200">
-                <a:latin typeface="Arial"/>
-              </a:rPr>
-              <a:t>PySpark with Hadoop Demo- MapReduce with wordcount </a:t>
-            </a:r>
-            <a:endParaRPr/>
-          </a:p>
-        </p:txBody>
-      </p:sp>
-      <p:sp>
-        <p:nvSpPr>
-          <p:cNvPr id="101" name="CustomShape 2"/>
+      </p:sp>
+      <p:sp>
+        <p:nvSpPr>
+          <p:cNvPr id="102" name="CustomShape 2"/>
           <p:cNvSpPr/>
           <p:nvPr/>
         </p:nvSpPr>
         <p:spPr>
           <a:xfrm>
-            <a:off x="503640" y="2452680"/>
-            <a:ext cx="9070200" cy="4383360"/>
+            <a:off x="503640" y="1768680"/>
+            <a:ext cx="9069840" cy="4383000"/>
           </a:xfrm>
           <a:prstGeom prst="rect">
             <a:avLst/>
@@ -3807,96 +4036,36 @@
         <p:txBody>
           <a:bodyPr lIns="0" rIns="0" tIns="0" bIns="0"/>
           <a:p>
-            <a:pPr>
-              <a:lnSpc>
-                <a:spcPct val="100000"/>
-              </a:lnSpc>
-              <a:buSzPct val="45000"/>
-              <a:buFont typeface="StarSymbol"/>
-              <a:buChar char="l"/>
-            </a:pPr>
-            <a:r>
-              <a:rPr lang="en-US" sz="2200">
-                <a:latin typeface="Century Schoolbook L"/>
-              </a:rPr>
-              <a:t>&gt;&gt;&gt; textFile = sc.textFile("file:///home/chetan306/inputfile.txt")</a:t>
-            </a:r>
-            <a:endParaRPr/>
-          </a:p>
-          <a:p>
-            <a:pPr>
-              <a:lnSpc>
-                <a:spcPct val="100000"/>
-              </a:lnSpc>
-              <a:buSzPct val="45000"/>
-              <a:buFont typeface="StarSymbol"/>
-              <a:buChar char="l"/>
-            </a:pPr>
-            <a:r>
-              <a:rPr lang="en-US" sz="2200">
-                <a:latin typeface="Century Schoolbook L"/>
-              </a:rPr>
-              <a:t>&gt;&gt;&gt; textFile.count()</a:t>
-            </a:r>
-            <a:endParaRPr/>
-          </a:p>
-          <a:p>
-            <a:pPr>
-              <a:lnSpc>
-                <a:spcPct val="100000"/>
-              </a:lnSpc>
-              <a:buSzPct val="45000"/>
-              <a:buFont typeface="StarSymbol"/>
-              <a:buChar char="l"/>
-            </a:pPr>
-            <a:r>
-              <a:rPr lang="en-US" sz="2200">
-                <a:latin typeface="Century Schoolbook L"/>
-              </a:rPr>
-              <a:t>&gt;&gt;&gt; textFile.first()</a:t>
-            </a:r>
-            <a:endParaRPr/>
-          </a:p>
-          <a:p>
-            <a:pPr>
-              <a:lnSpc>
-                <a:spcPct val="100000"/>
-              </a:lnSpc>
-              <a:buSzPct val="45000"/>
-              <a:buFont typeface="StarSymbol"/>
-              <a:buChar char="l"/>
-            </a:pPr>
-            <a:r>
-              <a:rPr lang="en-US" sz="2200">
-                <a:latin typeface="Century Schoolbook L"/>
-              </a:rPr>
-              <a:t>&gt;&gt;&gt; wordCounts = textFile.flatMap(lambda line: line.split()).map(lambda word: (word, 1)).reduceByKey(lambda a, b: a+b)</a:t>
-            </a:r>
-            <a:endParaRPr/>
-          </a:p>
-          <a:p>
-            <a:pPr>
-              <a:lnSpc>
-                <a:spcPct val="100000"/>
-              </a:lnSpc>
-              <a:buSzPct val="45000"/>
-              <a:buFont typeface="StarSymbol"/>
-              <a:buChar char="l"/>
-            </a:pPr>
-            <a:r>
-              <a:rPr lang="en-US" sz="2200">
-                <a:latin typeface="Century Schoolbook L"/>
-              </a:rPr>
-              <a:t>&gt;&gt;&gt; wordCounts.collect()</a:t>
-            </a:r>
-            <a:endParaRPr/>
-          </a:p>
-          <a:p>
-            <a:pPr>
-              <a:lnSpc>
-                <a:spcPct val="100000"/>
-              </a:lnSpc>
-            </a:pPr>
+            <a:pPr algn="ctr">
+              <a:lnSpc>
+                <a:spcPct val="100000"/>
+              </a:lnSpc>
+            </a:pPr>
+            <a:endParaRPr/>
+          </a:p>
+          <a:p>
+            <a:pPr algn="ctr">
+              <a:lnSpc>
+                <a:spcPct val="100000"/>
+              </a:lnSpc>
+            </a:pPr>
+            <a:endParaRPr/>
+          </a:p>
+          <a:p>
+            <a:pPr algn="ctr">
+              <a:lnSpc>
+                <a:spcPct val="100000"/>
+              </a:lnSpc>
+              <a:buSzPct val="45000"/>
+              <a:buFont typeface="StarSymbol"/>
+              <a:buChar char="l"/>
+            </a:pPr>
+            <a:r>
+              <a:rPr lang="en-US" sz="4400">
+                <a:latin typeface="Century Schoolbook L"/>
+              </a:rPr>
+              <a:t>PySpark with Hadoop Demo</a:t>
+            </a:r>
             <a:endParaRPr/>
           </a:p>
         </p:txBody>
@@ -3906,10 +4075,10 @@
   <p:timing>
     <p:tnLst>
       <p:par>
-        <p:cTn id="27" dur="indefinite" restart="never" nodeType="tmRoot">
+        <p:cTn id="25" dur="indefinite" restart="never" nodeType="tmRoot">
           <p:childTnLst>
             <p:seq>
-              <p:cTn id="28" nodeType="mainSeq"/>
+              <p:cTn id="26" nodeType="mainSeq"/>
               <p:prevCondLst>
                 <p:cond delay="0" evt="onPrev">
                   <p:tgtEl>
@@ -3952,14 +4121,14 @@
       </p:grpSpPr>
       <p:sp>
         <p:nvSpPr>
-          <p:cNvPr id="102" name="CustomShape 1"/>
+          <p:cNvPr id="103" name="CustomShape 1"/>
           <p:cNvSpPr/>
           <p:nvPr/>
         </p:nvSpPr>
         <p:spPr>
           <a:xfrm>
-            <a:off x="503640" y="-58680"/>
-            <a:ext cx="9070200" cy="1260720"/>
+            <a:off x="503640" y="301320"/>
+            <a:ext cx="9069840" cy="1260360"/>
           </a:xfrm>
           <a:prstGeom prst="rect">
             <a:avLst/>
@@ -3978,25 +4147,25 @@
               </a:lnSpc>
             </a:pPr>
             <a:r>
-              <a:rPr lang="en-US" sz="2800">
-                <a:latin typeface="Century Schoolbook L"/>
-              </a:rPr>
-              <a:t>Data Science in University Education Initiative</a:t>
-            </a:r>
-            <a:endParaRPr/>
-          </a:p>
-        </p:txBody>
-      </p:sp>
-      <p:sp>
-        <p:nvSpPr>
-          <p:cNvPr id="103" name="CustomShape 2"/>
+              <a:rPr lang="en-US" sz="3200">
+                <a:latin typeface="Arial"/>
+              </a:rPr>
+              <a:t>PySpark with Hadoop Demo- MapReduce with wordcount </a:t>
+            </a:r>
+            <a:endParaRPr/>
+          </a:p>
+        </p:txBody>
+      </p:sp>
+      <p:sp>
+        <p:nvSpPr>
+          <p:cNvPr id="104" name="CustomShape 2"/>
           <p:cNvSpPr/>
           <p:nvPr/>
         </p:nvSpPr>
         <p:spPr>
           <a:xfrm>
-            <a:off x="503640" y="1227600"/>
-            <a:ext cx="9070200" cy="5813280"/>
+            <a:off x="503640" y="2452680"/>
+            <a:ext cx="9069840" cy="4383000"/>
           </a:xfrm>
           <a:prstGeom prst="rect">
             <a:avLst/>
@@ -4021,46 +4190,97 @@
               <a:rPr lang="en-US" sz="2200">
                 <a:latin typeface="Century Schoolbook L"/>
               </a:rPr>
-              <a:t>Data Science Lab, Computer Science Department – University of Kachchh.</a:t>
-            </a:r>
-            <a:endParaRPr/>
-          </a:p>
-        </p:txBody>
-      </p:sp>
-      <p:pic>
-        <p:nvPicPr>
-          <p:cNvPr id="104" name="" descr=""/>
-          <p:cNvPicPr/>
-          <p:nvPr/>
-        </p:nvPicPr>
-        <p:blipFill>
-          <a:blip r:embed="rId1"/>
-          <a:stretch>
-            <a:fillRect/>
-          </a:stretch>
-        </p:blipFill>
-        <p:spPr>
-          <a:xfrm>
-            <a:off x="32040" y="2082600"/>
-            <a:ext cx="10048680" cy="5324040"/>
-          </a:xfrm>
-          <a:prstGeom prst="rect">
-            <a:avLst/>
-          </a:prstGeom>
-          <a:ln>
-            <a:noFill/>
-          </a:ln>
-        </p:spPr>
-      </p:pic>
+              <a:t>&gt;&gt;&gt; textFile = sc.textFile("file:///home/chetan306/inputfile.txt")</a:t>
+            </a:r>
+            <a:endParaRPr/>
+          </a:p>
+          <a:p>
+            <a:pPr>
+              <a:lnSpc>
+                <a:spcPct val="100000"/>
+              </a:lnSpc>
+              <a:buSzPct val="45000"/>
+              <a:buFont typeface="StarSymbol"/>
+              <a:buChar char="l"/>
+            </a:pPr>
+            <a:r>
+              <a:rPr lang="en-US" sz="2200">
+                <a:latin typeface="Century Schoolbook L"/>
+              </a:rPr>
+              <a:t>&gt;&gt;&gt; textFile.count()</a:t>
+            </a:r>
+            <a:endParaRPr/>
+          </a:p>
+          <a:p>
+            <a:pPr>
+              <a:lnSpc>
+                <a:spcPct val="100000"/>
+              </a:lnSpc>
+              <a:buSzPct val="45000"/>
+              <a:buFont typeface="StarSymbol"/>
+              <a:buChar char="l"/>
+            </a:pPr>
+            <a:r>
+              <a:rPr lang="en-US" sz="2200">
+                <a:latin typeface="Century Schoolbook L"/>
+              </a:rPr>
+              <a:t>&gt;&gt;&gt; textFile.first()</a:t>
+            </a:r>
+            <a:endParaRPr/>
+          </a:p>
+          <a:p>
+            <a:pPr>
+              <a:lnSpc>
+                <a:spcPct val="100000"/>
+              </a:lnSpc>
+              <a:buSzPct val="45000"/>
+              <a:buFont typeface="StarSymbol"/>
+              <a:buChar char="l"/>
+            </a:pPr>
+            <a:r>
+              <a:rPr lang="en-US" sz="2200">
+                <a:latin typeface="Century Schoolbook L"/>
+              </a:rPr>
+              <a:t>&gt;&gt;&gt; wordCounts = textFile.flatMap(lambda line: line.split()).map(lambda word: (word, 1)).reduceByKey(lambda a, b: a+b)</a:t>
+            </a:r>
+            <a:endParaRPr/>
+          </a:p>
+          <a:p>
+            <a:pPr>
+              <a:lnSpc>
+                <a:spcPct val="100000"/>
+              </a:lnSpc>
+              <a:buSzPct val="45000"/>
+              <a:buFont typeface="StarSymbol"/>
+              <a:buChar char="l"/>
+            </a:pPr>
+            <a:r>
+              <a:rPr lang="en-US" sz="2200">
+                <a:latin typeface="Century Schoolbook L"/>
+              </a:rPr>
+              <a:t>&gt;&gt;&gt; wordCounts.collect()</a:t>
+            </a:r>
+            <a:endParaRPr/>
+          </a:p>
+          <a:p>
+            <a:pPr>
+              <a:lnSpc>
+                <a:spcPct val="100000"/>
+              </a:lnSpc>
+            </a:pPr>
+            <a:endParaRPr/>
+          </a:p>
+        </p:txBody>
+      </p:sp>
     </p:spTree>
   </p:cSld>
   <p:timing>
     <p:tnLst>
       <p:par>
-        <p:cTn id="29" dur="indefinite" restart="never" nodeType="tmRoot">
+        <p:cTn id="27" dur="indefinite" restart="never" nodeType="tmRoot">
           <p:childTnLst>
             <p:seq>
-              <p:cTn id="30" nodeType="mainSeq"/>
+              <p:cTn id="28" nodeType="mainSeq"/>
               <p:prevCondLst>
                 <p:cond delay="0" evt="onPrev">
                   <p:tgtEl>
@@ -4110,7 +4330,7 @@
         <p:spPr>
           <a:xfrm>
             <a:off x="503640" y="-58680"/>
-            <a:ext cx="9070200" cy="1260720"/>
+            <a:ext cx="9069840" cy="1260360"/>
           </a:xfrm>
           <a:prstGeom prst="rect">
             <a:avLst/>
@@ -4147,7 +4367,7 @@
         <p:spPr>
           <a:xfrm>
             <a:off x="503640" y="1227600"/>
-            <a:ext cx="9070200" cy="5813280"/>
+            <a:ext cx="9069840" cy="5812920"/>
           </a:xfrm>
           <a:prstGeom prst="rect">
             <a:avLst/>
@@ -4172,13 +4392,7 @@
               <a:rPr lang="en-US" sz="2200">
                 <a:latin typeface="Century Schoolbook L"/>
               </a:rPr>
-              <a:t>- </a:t>
-            </a:r>
-            <a:r>
-              <a:rPr b="1" lang="en-US" sz="2000">
-                <a:latin typeface="Century Schoolbook L"/>
-              </a:rPr>
-              <a:t>Machine learning / Data Science with Python</a:t>
+              <a:t>Data Science Lab, Computer Science Department – University of Kachchh.</a:t>
             </a:r>
             <a:endParaRPr/>
           </a:p>
@@ -4198,8 +4412,8 @@
         </p:blipFill>
         <p:spPr>
           <a:xfrm>
-            <a:off x="914400" y="1645920"/>
-            <a:ext cx="6949440" cy="5913720"/>
+            <a:off x="32040" y="2082600"/>
+            <a:ext cx="10048320" cy="5323680"/>
           </a:xfrm>
           <a:prstGeom prst="rect">
             <a:avLst/>
@@ -4214,10 +4428,10 @@
   <p:timing>
     <p:tnLst>
       <p:par>
-        <p:cTn id="31" dur="indefinite" restart="never" nodeType="tmRoot">
+        <p:cTn id="29" dur="indefinite" restart="never" nodeType="tmRoot">
           <p:childTnLst>
             <p:seq>
-              <p:cTn id="32" nodeType="mainSeq"/>
+              <p:cTn id="30" nodeType="mainSeq"/>
               <p:prevCondLst>
                 <p:cond delay="0" evt="onPrev">
                   <p:tgtEl>
@@ -4266,8 +4480,8 @@
         </p:nvSpPr>
         <p:spPr>
           <a:xfrm>
-            <a:off x="503640" y="301320"/>
-            <a:ext cx="9070200" cy="1260720"/>
+            <a:off x="503640" y="-58680"/>
+            <a:ext cx="9069840" cy="1260360"/>
           </a:xfrm>
           <a:prstGeom prst="rect">
             <a:avLst/>
@@ -4286,10 +4500,10 @@
               </a:lnSpc>
             </a:pPr>
             <a:r>
-              <a:rPr lang="en-US" sz="4000">
-                <a:latin typeface="Century Schoolbook L"/>
-              </a:rPr>
-              <a:t>Questions ?</a:t>
+              <a:rPr lang="en-US" sz="2800">
+                <a:latin typeface="Century Schoolbook L"/>
+              </a:rPr>
+              <a:t>Data Science in University Education Initiative</a:t>
             </a:r>
             <a:endParaRPr/>
           </a:p>
@@ -4303,8 +4517,8 @@
         </p:nvSpPr>
         <p:spPr>
           <a:xfrm>
-            <a:off x="503640" y="1768680"/>
-            <a:ext cx="9070200" cy="4383360"/>
+            <a:off x="503640" y="1227600"/>
+            <a:ext cx="9069840" cy="5812920"/>
           </a:xfrm>
           <a:prstGeom prst="rect">
             <a:avLst/>
@@ -4314,16 +4528,67 @@
             <a:noFill/>
           </a:ln>
         </p:spPr>
-      </p:sp>
+        <p:txBody>
+          <a:bodyPr lIns="0" rIns="0" tIns="0" bIns="0"/>
+          <a:p>
+            <a:pPr>
+              <a:lnSpc>
+                <a:spcPct val="100000"/>
+              </a:lnSpc>
+              <a:buSzPct val="45000"/>
+              <a:buFont typeface="StarSymbol"/>
+              <a:buChar char="l"/>
+            </a:pPr>
+            <a:r>
+              <a:rPr lang="en-US" sz="2200">
+                <a:latin typeface="Century Schoolbook L"/>
+              </a:rPr>
+              <a:t>- </a:t>
+            </a:r>
+            <a:r>
+              <a:rPr b="1" lang="en-US" sz="2000">
+                <a:latin typeface="Century Schoolbook L"/>
+              </a:rPr>
+              <a:t>Machine learning / Data Science with Python</a:t>
+            </a:r>
+            <a:endParaRPr/>
+          </a:p>
+        </p:txBody>
+      </p:sp>
+      <p:pic>
+        <p:nvPicPr>
+          <p:cNvPr id="110" name="" descr=""/>
+          <p:cNvPicPr/>
+          <p:nvPr/>
+        </p:nvPicPr>
+        <p:blipFill>
+          <a:blip r:embed="rId1"/>
+          <a:stretch>
+            <a:fillRect/>
+          </a:stretch>
+        </p:blipFill>
+        <p:spPr>
+          <a:xfrm>
+            <a:off x="914400" y="1645920"/>
+            <a:ext cx="6949080" cy="5913360"/>
+          </a:xfrm>
+          <a:prstGeom prst="rect">
+            <a:avLst/>
+          </a:prstGeom>
+          <a:ln>
+            <a:noFill/>
+          </a:ln>
+        </p:spPr>
+      </p:pic>
     </p:spTree>
   </p:cSld>
   <p:timing>
     <p:tnLst>
       <p:par>
-        <p:cTn id="33" dur="indefinite" restart="never" nodeType="tmRoot">
+        <p:cTn id="31" dur="indefinite" restart="never" nodeType="tmRoot">
           <p:childTnLst>
             <p:seq>
-              <p:cTn id="34" nodeType="mainSeq"/>
+              <p:cTn id="32" nodeType="mainSeq"/>
               <p:prevCondLst>
                 <p:cond delay="0" evt="onPrev">
                   <p:tgtEl>
@@ -4366,14 +4631,14 @@
       </p:grpSpPr>
       <p:sp>
         <p:nvSpPr>
-          <p:cNvPr id="110" name="CustomShape 1"/>
+          <p:cNvPr id="111" name="CustomShape 1"/>
           <p:cNvSpPr/>
           <p:nvPr/>
         </p:nvSpPr>
         <p:spPr>
           <a:xfrm>
             <a:off x="503640" y="301320"/>
-            <a:ext cx="9070200" cy="1260720"/>
+            <a:ext cx="9069840" cy="1260360"/>
           </a:xfrm>
           <a:prstGeom prst="rect">
             <a:avLst/>
@@ -4395,22 +4660,128 @@
               <a:rPr lang="en-US" sz="4000">
                 <a:latin typeface="Century Schoolbook L"/>
               </a:rPr>
-              <a:t>Resources</a:t>
-            </a:r>
-            <a:endParaRPr/>
-          </a:p>
-        </p:txBody>
-      </p:sp>
-      <p:sp>
-        <p:nvSpPr>
-          <p:cNvPr id="111" name="CustomShape 2"/>
+              <a:t>Questions ?</a:t>
+            </a:r>
+            <a:endParaRPr/>
+          </a:p>
+        </p:txBody>
+      </p:sp>
+      <p:sp>
+        <p:nvSpPr>
+          <p:cNvPr id="112" name="CustomShape 2"/>
           <p:cNvSpPr/>
           <p:nvPr/>
         </p:nvSpPr>
         <p:spPr>
           <a:xfrm>
             <a:off x="503640" y="1768680"/>
-            <a:ext cx="9070200" cy="4383360"/>
+            <a:ext cx="9069840" cy="4383000"/>
+          </a:xfrm>
+          <a:prstGeom prst="rect">
+            <a:avLst/>
+          </a:prstGeom>
+          <a:noFill/>
+          <a:ln>
+            <a:noFill/>
+          </a:ln>
+        </p:spPr>
+      </p:sp>
+    </p:spTree>
+  </p:cSld>
+  <p:timing>
+    <p:tnLst>
+      <p:par>
+        <p:cTn id="33" dur="indefinite" restart="never" nodeType="tmRoot">
+          <p:childTnLst>
+            <p:seq>
+              <p:cTn id="34" nodeType="mainSeq"/>
+              <p:prevCondLst>
+                <p:cond delay="0" evt="onPrev">
+                  <p:tgtEl>
+                    <p:sldTgt/>
+                  </p:tgtEl>
+                </p:cond>
+              </p:prevCondLst>
+              <p:nextCondLst>
+                <p:cond delay="0" evt="onNext">
+                  <p:tgtEl>
+                    <p:sldTgt/>
+                  </p:tgtEl>
+                </p:cond>
+              </p:nextCondLst>
+            </p:seq>
+          </p:childTnLst>
+        </p:cTn>
+      </p:par>
+    </p:tnLst>
+  </p:timing>
+</p:sld>
+</file>
+
+<file path=ppt/slides/slide19.xml><?xml version="1.0" encoding="utf-8"?>
+<p:sld xmlns:a="http://schemas.openxmlformats.org/drawingml/2006/main" xmlns:p="http://schemas.openxmlformats.org/presentationml/2006/main" xmlns:r="http://schemas.openxmlformats.org/officeDocument/2006/relationships">
+  <p:cSld>
+    <p:spTree>
+      <p:nvGrpSpPr>
+        <p:cNvPr id="1" name=""/>
+        <p:cNvGrpSpPr/>
+        <p:nvPr/>
+      </p:nvGrpSpPr>
+      <p:grpSpPr>
+        <a:xfrm>
+          <a:off x="0" y="0"/>
+          <a:ext cx="0" cy="0"/>
+          <a:chOff x="0" y="0"/>
+          <a:chExt cx="0" cy="0"/>
+        </a:xfrm>
+      </p:grpSpPr>
+      <p:sp>
+        <p:nvSpPr>
+          <p:cNvPr id="113" name="CustomShape 1"/>
+          <p:cNvSpPr/>
+          <p:nvPr/>
+        </p:nvSpPr>
+        <p:spPr>
+          <a:xfrm>
+            <a:off x="503640" y="301320"/>
+            <a:ext cx="9069840" cy="1260360"/>
+          </a:xfrm>
+          <a:prstGeom prst="rect">
+            <a:avLst/>
+          </a:prstGeom>
+          <a:noFill/>
+          <a:ln>
+            <a:noFill/>
+          </a:ln>
+        </p:spPr>
+        <p:txBody>
+          <a:bodyPr lIns="0" rIns="0" tIns="0" bIns="0" anchor="ctr"/>
+          <a:p>
+            <a:pPr algn="ctr">
+              <a:lnSpc>
+                <a:spcPct val="100000"/>
+              </a:lnSpc>
+            </a:pPr>
+            <a:r>
+              <a:rPr lang="en-US" sz="4000">
+                <a:latin typeface="Century Schoolbook L"/>
+              </a:rPr>
+              <a:t>Resources</a:t>
+            </a:r>
+            <a:endParaRPr/>
+          </a:p>
+        </p:txBody>
+      </p:sp>
+      <p:sp>
+        <p:nvSpPr>
+          <p:cNvPr id="114" name="CustomShape 2"/>
+          <p:cNvSpPr/>
+          <p:nvPr/>
+        </p:nvSpPr>
+        <p:spPr>
+          <a:xfrm>
+            <a:off x="503640" y="1768680"/>
+            <a:ext cx="9069840" cy="4383000"/>
           </a:xfrm>
           <a:prstGeom prst="rect">
             <a:avLst/>
@@ -4524,7 +4895,7 @@
         <p:spPr>
           <a:xfrm>
             <a:off x="503640" y="301320"/>
-            <a:ext cx="9070200" cy="1260720"/>
+            <a:ext cx="9069840" cy="1260360"/>
           </a:xfrm>
           <a:prstGeom prst="rect">
             <a:avLst/>
@@ -4561,7 +4932,7 @@
         <p:spPr>
           <a:xfrm>
             <a:off x="503640" y="1768680"/>
-            <a:ext cx="9070200" cy="4383360"/>
+            <a:ext cx="9069840" cy="4383000"/>
           </a:xfrm>
           <a:prstGeom prst="rect">
             <a:avLst/>
@@ -4863,7 +5234,7 @@
         <p:spPr>
           <a:xfrm>
             <a:off x="503640" y="301320"/>
-            <a:ext cx="9070200" cy="1260720"/>
+            <a:ext cx="9069840" cy="1260360"/>
           </a:xfrm>
           <a:prstGeom prst="rect">
             <a:avLst/>
@@ -4900,7 +5271,7 @@
         <p:spPr>
           <a:xfrm>
             <a:off x="503640" y="1768680"/>
-            <a:ext cx="9070200" cy="4383360"/>
+            <a:ext cx="9069840" cy="4383000"/>
           </a:xfrm>
           <a:prstGeom prst="rect">
             <a:avLst/>
@@ -5084,225 +5455,76 @@
       </p:grpSpPr>
       <p:sp>
         <p:nvSpPr>
-          <p:cNvPr id="79" name="CustomShape 1"/>
-          <p:cNvSpPr/>
+          <p:cNvPr id="79" name="TextShape 1"/>
+          <p:cNvSpPr txBox="1"/>
           <p:nvPr/>
         </p:nvSpPr>
         <p:spPr>
           <a:xfrm>
-            <a:off x="503640" y="301320"/>
-            <a:ext cx="9070200" cy="1260720"/>
-          </a:xfrm>
-          <a:prstGeom prst="rect">
-            <a:avLst/>
-          </a:prstGeom>
-          <a:noFill/>
+            <a:off x="503640" y="300960"/>
+            <a:ext cx="9072000" cy="1261800"/>
+          </a:xfrm>
+          <a:prstGeom prst="rect">
+            <a:avLst/>
+          </a:prstGeom>
+        </p:spPr>
+        <p:txBody>
+          <a:bodyPr lIns="0" rIns="0" tIns="0" bIns="0" anchor="ctr"/>
+          <a:p>
+            <a:pPr algn="ctr"/>
+            <a:endParaRPr/>
+          </a:p>
+        </p:txBody>
+      </p:sp>
+      <p:sp>
+        <p:nvSpPr>
+          <p:cNvPr id="80" name="TextShape 2"/>
+          <p:cNvSpPr txBox="1"/>
+          <p:nvPr/>
+        </p:nvSpPr>
+        <p:spPr>
+          <a:xfrm>
+            <a:off x="503640" y="1768320"/>
+            <a:ext cx="9072000" cy="4384080"/>
+          </a:xfrm>
+          <a:prstGeom prst="rect">
+            <a:avLst/>
+          </a:prstGeom>
+        </p:spPr>
+        <p:txBody>
+          <a:bodyPr lIns="0" rIns="0" tIns="0" bIns="0"/>
+          <a:p>
+            <a:endParaRPr/>
+          </a:p>
+        </p:txBody>
+      </p:sp>
+      <p:pic>
+        <p:nvPicPr>
+          <p:cNvPr id="81" name="" descr=""/>
+          <p:cNvPicPr/>
+          <p:nvPr/>
+        </p:nvPicPr>
+        <p:blipFill>
+          <a:blip r:embed="rId1"/>
+          <a:stretch>
+            <a:fillRect/>
+          </a:stretch>
+        </p:blipFill>
+        <p:spPr>
+          <a:xfrm>
+            <a:off x="19080" y="0"/>
+            <a:ext cx="10222920" cy="7559640"/>
+          </a:xfrm>
+          <a:prstGeom prst="rect">
+            <a:avLst/>
+          </a:prstGeom>
           <a:ln>
             <a:noFill/>
           </a:ln>
         </p:spPr>
-        <p:txBody>
-          <a:bodyPr lIns="0" rIns="0" tIns="0" bIns="0" anchor="ctr"/>
-          <a:p>
-            <a:pPr algn="ctr">
-              <a:lnSpc>
-                <a:spcPct val="100000"/>
-              </a:lnSpc>
-            </a:pPr>
-            <a:r>
-              <a:rPr lang="en-US" sz="4000">
-                <a:latin typeface="Century Schoolbook L"/>
-              </a:rPr>
-              <a:t>Predictive</a:t>
-            </a:r>
-            <a:r>
-              <a:rPr lang="en-US" sz="4400">
-                <a:latin typeface="Arial"/>
-              </a:rPr>
-              <a:t> </a:t>
-            </a:r>
-            <a:r>
-              <a:rPr lang="en-US" sz="4000">
-                <a:latin typeface="Century Schoolbook L"/>
-              </a:rPr>
-              <a:t>Modeling Cycle</a:t>
-            </a:r>
-            <a:endParaRPr/>
-          </a:p>
-        </p:txBody>
-      </p:sp>
-      <p:sp>
-        <p:nvSpPr>
-          <p:cNvPr id="80" name="CustomShape 2"/>
-          <p:cNvSpPr/>
-          <p:nvPr/>
-        </p:nvSpPr>
-        <p:spPr>
-          <a:xfrm>
-            <a:off x="365760" y="1768680"/>
-            <a:ext cx="9070200" cy="5271120"/>
-          </a:xfrm>
-          <a:prstGeom prst="rect">
-            <a:avLst/>
-          </a:prstGeom>
-          <a:noFill/>
-          <a:ln>
-            <a:noFill/>
-          </a:ln>
-        </p:spPr>
-        <p:txBody>
-          <a:bodyPr lIns="0" rIns="0" tIns="0" bIns="0"/>
-          <a:p>
-            <a:pPr>
-              <a:lnSpc>
-                <a:spcPct val="100000"/>
-              </a:lnSpc>
-            </a:pPr>
-            <a:r>
-              <a:rPr lang="en-US" sz="2000">
-                <a:latin typeface="Century Schoolbook L"/>
-              </a:rPr>
-              <a:t>1. Data Quality (Removing Noisy, Missing Data)</a:t>
-            </a:r>
-            <a:endParaRPr/>
-          </a:p>
-          <a:p>
-            <a:pPr>
-              <a:lnSpc>
-                <a:spcPct val="100000"/>
-              </a:lnSpc>
-            </a:pPr>
-            <a:r>
-              <a:rPr lang="en-US" sz="2000">
-                <a:latin typeface="Century Schoolbook L"/>
-              </a:rPr>
-              <a:t>2. Feature Engineering</a:t>
-            </a:r>
-            <a:endParaRPr/>
-          </a:p>
-          <a:p>
-            <a:pPr>
-              <a:lnSpc>
-                <a:spcPct val="100000"/>
-              </a:lnSpc>
-            </a:pPr>
-            <a:r>
-              <a:rPr lang="en-US" sz="2000">
-                <a:latin typeface="Century Schoolbook L"/>
-              </a:rPr>
-              <a:t>3. Choosing Best Model: " based on culture of Data, For ex. If continues data-points go with Linear Regression , If categorical binomial prediction requires then go with Logistic Regression, For Random sample of data(Feature randomization) and have better generalization performance. other like Gradient Boosting Trees for optimal linear combination of trees and weighted sum of predictions of individual trees."</a:t>
-            </a:r>
-            <a:endParaRPr/>
-          </a:p>
-          <a:p>
-            <a:pPr>
-              <a:lnSpc>
-                <a:spcPct val="100000"/>
-              </a:lnSpc>
-            </a:pPr>
-            <a:r>
-              <a:rPr lang="en-US" sz="2000">
-                <a:latin typeface="Century Schoolbook L"/>
-              </a:rPr>
-              <a:t>Try from Linear Regression to Deep Learning (RNN, CNN)</a:t>
-            </a:r>
-            <a:endParaRPr/>
-          </a:p>
-          <a:p>
-            <a:pPr>
-              <a:lnSpc>
-                <a:spcPct val="100000"/>
-              </a:lnSpc>
-            </a:pPr>
-            <a:r>
-              <a:rPr lang="en-US" sz="2000">
-                <a:latin typeface="Century Schoolbook L"/>
-              </a:rPr>
-              <a:t>4. Ensemble Model (Regression + Random Forest + XGBoost)</a:t>
-            </a:r>
-            <a:endParaRPr/>
-          </a:p>
-          <a:p>
-            <a:pPr>
-              <a:lnSpc>
-                <a:spcPct val="100000"/>
-              </a:lnSpc>
-            </a:pPr>
-            <a:r>
-              <a:rPr lang="en-US" sz="2000">
-                <a:latin typeface="Century Schoolbook L"/>
-              </a:rPr>
-              <a:t>5. Tune Hyper-parameters(For ex in Deep Neural Network, Needs to tune mini-batch size, learning rate, epoch, hidden layers)</a:t>
-            </a:r>
-            <a:endParaRPr/>
-          </a:p>
-          <a:p>
-            <a:pPr>
-              <a:lnSpc>
-                <a:spcPct val="100000"/>
-              </a:lnSpc>
-            </a:pPr>
-            <a:r>
-              <a:rPr lang="en-US" sz="2000">
-                <a:latin typeface="Century Schoolbook L"/>
-              </a:rPr>
-              <a:t>6. Model Compression - Port model to embedded / mobile devices using Compress matrices(Sparsify, Shrink, Break, Quantize)</a:t>
-            </a:r>
-            <a:endParaRPr/>
-          </a:p>
-          <a:p>
-            <a:pPr>
-              <a:lnSpc>
-                <a:spcPct val="100000"/>
-              </a:lnSpc>
-            </a:pPr>
-            <a:r>
-              <a:rPr lang="en-US" sz="2000">
-                <a:latin typeface="Century Schoolbook L"/>
-              </a:rPr>
-              <a:t>7. Run on smart-phone</a:t>
-            </a:r>
-            <a:endParaRPr/>
-          </a:p>
-          <a:p>
-            <a:pPr>
-              <a:lnSpc>
-                <a:spcPct val="100000"/>
-              </a:lnSpc>
-            </a:pPr>
-            <a:endParaRPr/>
-          </a:p>
-        </p:txBody>
-      </p:sp>
+      </p:pic>
     </p:spTree>
   </p:cSld>
-  <p:timing>
-    <p:tnLst>
-      <p:par>
-        <p:cTn id="7" dur="indefinite" restart="never" nodeType="tmRoot">
-          <p:childTnLst>
-            <p:seq>
-              <p:cTn id="8" nodeType="mainSeq"/>
-              <p:prevCondLst>
-                <p:cond delay="0" evt="onPrev">
-                  <p:tgtEl>
-                    <p:sldTgt/>
-                  </p:tgtEl>
-                </p:cond>
-              </p:prevCondLst>
-              <p:nextCondLst>
-                <p:cond delay="0" evt="onNext">
-                  <p:tgtEl>
-                    <p:sldTgt/>
-                  </p:tgtEl>
-                </p:cond>
-              </p:nextCondLst>
-            </p:seq>
-          </p:childTnLst>
-        </p:cTn>
-      </p:par>
-    </p:tnLst>
-  </p:timing>
 </p:sld>
 </file>
 
@@ -5325,14 +5547,14 @@
       </p:grpSpPr>
       <p:sp>
         <p:nvSpPr>
-          <p:cNvPr id="81" name="CustomShape 1"/>
+          <p:cNvPr id="82" name="CustomShape 1"/>
           <p:cNvSpPr/>
           <p:nvPr/>
         </p:nvSpPr>
         <p:spPr>
           <a:xfrm>
             <a:off x="503640" y="301320"/>
-            <a:ext cx="9070200" cy="1260720"/>
+            <a:ext cx="9069840" cy="1260360"/>
           </a:xfrm>
           <a:prstGeom prst="rect">
             <a:avLst/>
@@ -5354,28 +5576,34 @@
               <a:rPr lang="en-US" sz="4000">
                 <a:latin typeface="Century Schoolbook L"/>
               </a:rPr>
-              <a:t>Big Data Cluster Tuning – </a:t>
-            </a:r>
-            <a:r>
-              <a:rPr lang="en-US" sz="2800">
-                <a:latin typeface="Century Schoolbook L"/>
-              </a:rPr>
-              <a:t>OS Parameters</a:t>
-            </a:r>
-            <a:endParaRPr/>
-          </a:p>
-        </p:txBody>
-      </p:sp>
-      <p:sp>
-        <p:nvSpPr>
-          <p:cNvPr id="82" name="CustomShape 2"/>
+              <a:t>Predictive</a:t>
+            </a:r>
+            <a:r>
+              <a:rPr lang="en-US" sz="4400">
+                <a:latin typeface="Arial"/>
+              </a:rPr>
+              <a:t> </a:t>
+            </a:r>
+            <a:r>
+              <a:rPr lang="en-US" sz="4000">
+                <a:latin typeface="Century Schoolbook L"/>
+              </a:rPr>
+              <a:t>Modeling Cycle</a:t>
+            </a:r>
+            <a:endParaRPr/>
+          </a:p>
+        </p:txBody>
+      </p:sp>
+      <p:sp>
+        <p:nvSpPr>
+          <p:cNvPr id="83" name="CustomShape 2"/>
           <p:cNvSpPr/>
           <p:nvPr/>
         </p:nvSpPr>
         <p:spPr>
           <a:xfrm>
-            <a:off x="503640" y="1768680"/>
-            <a:ext cx="9070200" cy="5362560"/>
+            <a:off x="365760" y="1768680"/>
+            <a:ext cx="9069840" cy="5270760"/>
           </a:xfrm>
           <a:prstGeom prst="rect">
             <a:avLst/>
@@ -5388,123 +5616,123 @@
         <p:txBody>
           <a:bodyPr lIns="0" rIns="0" tIns="0" bIns="0"/>
           <a:p>
-            <a:r>
-              <a:rPr lang="en-US" sz="1600">
-                <a:latin typeface="Courier 10 Pitch"/>
-              </a:rPr>
-              <a:t>TPS (Transaction Per Second) - throughput for every Jobs.</a:t>
-            </a:r>
-            <a:endParaRPr/>
-          </a:p>
-          <a:p>
-            <a:endParaRPr/>
-          </a:p>
-          <a:p>
-            <a:r>
-              <a:rPr lang="en-US" sz="1600">
-                <a:latin typeface="Courier 10 Pitch"/>
-              </a:rPr>
-              <a:t>Time Wait Interval - TCP - For ex. 4 min</a:t>
-            </a:r>
-            <a:endParaRPr/>
-          </a:p>
-          <a:p>
-            <a:endParaRPr/>
-          </a:p>
-          <a:p>
-            <a:r>
-              <a:rPr lang="en-US" sz="1600">
-                <a:latin typeface="Courier 10 Pitch"/>
-              </a:rPr>
-              <a:t>Max.port</a:t>
-            </a:r>
-            <a:endParaRPr/>
-          </a:p>
-          <a:p>
-            <a:r>
-              <a:rPr lang="en-US" sz="1600">
-                <a:latin typeface="Courier 10 Pitch"/>
-              </a:rPr>
-              <a:t>max.connection</a:t>
-            </a:r>
-            <a:endParaRPr/>
-          </a:p>
-          <a:p>
-            <a:endParaRPr/>
-          </a:p>
-          <a:p>
-            <a:r>
-              <a:rPr lang="en-US" sz="1600">
-                <a:latin typeface="Courier 10 Pitch"/>
-              </a:rPr>
-              <a:t>sysctl net.ipv4.ip_local_port_range</a:t>
-            </a:r>
-            <a:endParaRPr/>
-          </a:p>
-          <a:p>
-            <a:r>
-              <a:rPr lang="en-US" sz="1600">
-                <a:latin typeface="Courier 10 Pitch"/>
-              </a:rPr>
-              <a:t>sysctl net.ipv4.tcp_fin_timeout</a:t>
-            </a:r>
-            <a:endParaRPr/>
-          </a:p>
-          <a:p>
-            <a:endParaRPr/>
-          </a:p>
-          <a:p>
-            <a:r>
-              <a:rPr lang="en-US" sz="1600">
-                <a:latin typeface="Courier 10 Pitch"/>
-              </a:rPr>
-              <a:t>Max Thread - sysctl -a | grep threads_max</a:t>
-            </a:r>
-            <a:endParaRPr/>
-          </a:p>
-          <a:p>
-            <a:r>
-              <a:rPr lang="en-US" sz="1600">
-                <a:latin typeface="Courier 10 Pitch"/>
-              </a:rPr>
-              <a:t>echo 120000 &gt; /proc/sys/kernal/threads_max</a:t>
-            </a:r>
-            <a:endParaRPr/>
-          </a:p>
-          <a:p>
-            <a:r>
-              <a:rPr lang="en-US" sz="1600">
-                <a:latin typeface="Courier 10 Pitch"/>
-              </a:rPr>
-              <a:t>echo 600000 &gt; /proc/sys</a:t>
-            </a:r>
-            <a:endParaRPr/>
-          </a:p>
-          <a:p>
-            <a:endParaRPr/>
-          </a:p>
-          <a:p>
-            <a:r>
-              <a:rPr lang="en-US" sz="1600">
-                <a:latin typeface="Courier 10 Pitch"/>
-              </a:rPr>
-              <a:t>cat /proc/sys/kernal/threads_max</a:t>
-            </a:r>
-            <a:endParaRPr/>
-          </a:p>
-          <a:p>
-            <a:endParaRPr/>
-          </a:p>
-          <a:p>
-            <a:r>
-              <a:rPr lang="en-US" sz="1600">
-                <a:latin typeface="Courier 10 Pitch"/>
-              </a:rPr>
-              <a:t>Number of Thread = Total Virtual Memory / (Stacksize * 1024 * 2024)</a:t>
-            </a:r>
-            <a:endParaRPr/>
-          </a:p>
-          <a:p>
+            <a:pPr>
+              <a:lnSpc>
+                <a:spcPct val="100000"/>
+              </a:lnSpc>
+            </a:pPr>
+            <a:r>
+              <a:rPr lang="en-US" sz="2000">
+                <a:latin typeface="Century Schoolbook L"/>
+              </a:rPr>
+              <a:t>1. Data Quality (Removing Noisy, Missing Data)</a:t>
+            </a:r>
+            <a:endParaRPr/>
+          </a:p>
+          <a:p>
+            <a:pPr>
+              <a:lnSpc>
+                <a:spcPct val="100000"/>
+              </a:lnSpc>
+            </a:pPr>
+            <a:r>
+              <a:rPr lang="en-US" sz="2000">
+                <a:latin typeface="Century Schoolbook L"/>
+              </a:rPr>
+              <a:t>2. Feature Engineering</a:t>
+            </a:r>
+            <a:endParaRPr/>
+          </a:p>
+          <a:p>
+            <a:pPr>
+              <a:lnSpc>
+                <a:spcPct val="100000"/>
+              </a:lnSpc>
+            </a:pPr>
+            <a:r>
+              <a:rPr lang="en-US" sz="2000">
+                <a:latin typeface="Century Schoolbook L"/>
+              </a:rPr>
+              <a:t>3. Choosing Best Model: " based on culture of Data, For ex. If continues data-points go with Linear Regression , If categorical binomial prediction requires then go with Logistic Regression, For Random sample of data(Feature randomization) and have better generalization performance. other like Gradient Boosting Trees for optimal linear combination of trees and weighted sum of predictions of individual trees."</a:t>
+            </a:r>
+            <a:endParaRPr/>
+          </a:p>
+          <a:p>
+            <a:pPr>
+              <a:lnSpc>
+                <a:spcPct val="100000"/>
+              </a:lnSpc>
+            </a:pPr>
+            <a:r>
+              <a:rPr lang="en-US" sz="2000">
+                <a:latin typeface="Century Schoolbook L"/>
+              </a:rPr>
+              <a:t>Try from Linear Regression to Deep Learning (RNN, CNN)</a:t>
+            </a:r>
+            <a:endParaRPr/>
+          </a:p>
+          <a:p>
+            <a:pPr>
+              <a:lnSpc>
+                <a:spcPct val="100000"/>
+              </a:lnSpc>
+            </a:pPr>
+            <a:r>
+              <a:rPr lang="en-US" sz="2000">
+                <a:latin typeface="Century Schoolbook L"/>
+              </a:rPr>
+              <a:t>4. Ensemble Model (Regression + Random Forest + XGBoost)</a:t>
+            </a:r>
+            <a:endParaRPr/>
+          </a:p>
+          <a:p>
+            <a:pPr>
+              <a:lnSpc>
+                <a:spcPct val="100000"/>
+              </a:lnSpc>
+            </a:pPr>
+            <a:r>
+              <a:rPr lang="en-US" sz="2000">
+                <a:latin typeface="Century Schoolbook L"/>
+              </a:rPr>
+              <a:t>5. Tune Hyper-parameters(For ex in Deep Neural Network, Needs to tune mini-batch size, learning rate, epoch, hidden layers)</a:t>
+            </a:r>
+            <a:endParaRPr/>
+          </a:p>
+          <a:p>
+            <a:pPr>
+              <a:lnSpc>
+                <a:spcPct val="100000"/>
+              </a:lnSpc>
+            </a:pPr>
+            <a:r>
+              <a:rPr lang="en-US" sz="2000">
+                <a:latin typeface="Century Schoolbook L"/>
+              </a:rPr>
+              <a:t>6. Model Compression - Port model to embedded / mobile devices using Compress matrices(Sparsify, Shrink, Break, Quantize)</a:t>
+            </a:r>
+            <a:endParaRPr/>
+          </a:p>
+          <a:p>
+            <a:pPr>
+              <a:lnSpc>
+                <a:spcPct val="100000"/>
+              </a:lnSpc>
+            </a:pPr>
+            <a:r>
+              <a:rPr lang="en-US" sz="2000">
+                <a:latin typeface="Century Schoolbook L"/>
+              </a:rPr>
+              <a:t>7. Run on smart-phone</a:t>
+            </a:r>
+            <a:endParaRPr/>
+          </a:p>
+          <a:p>
+            <a:pPr>
+              <a:lnSpc>
+                <a:spcPct val="100000"/>
+              </a:lnSpc>
+            </a:pPr>
             <a:endParaRPr/>
           </a:p>
         </p:txBody>
@@ -5514,10 +5742,10 @@
   <p:timing>
     <p:tnLst>
       <p:par>
-        <p:cTn id="9" dur="indefinite" restart="never" nodeType="tmRoot">
+        <p:cTn id="7" dur="indefinite" restart="never" nodeType="tmRoot">
           <p:childTnLst>
             <p:seq>
-              <p:cTn id="10" nodeType="mainSeq"/>
+              <p:cTn id="8" nodeType="mainSeq"/>
               <p:prevCondLst>
                 <p:cond delay="0" evt="onPrev">
                   <p:tgtEl>
@@ -5560,14 +5788,14 @@
       </p:grpSpPr>
       <p:sp>
         <p:nvSpPr>
-          <p:cNvPr id="83" name="CustomShape 1"/>
+          <p:cNvPr id="84" name="CustomShape 1"/>
           <p:cNvSpPr/>
           <p:nvPr/>
         </p:nvSpPr>
         <p:spPr>
           <a:xfrm>
-            <a:off x="503640" y="276480"/>
-            <a:ext cx="9070200" cy="1310400"/>
+            <a:off x="503640" y="301320"/>
+            <a:ext cx="9069840" cy="1260360"/>
           </a:xfrm>
           <a:prstGeom prst="rect">
             <a:avLst/>
@@ -5589,22 +5817,28 @@
               <a:rPr lang="en-US" sz="4000">
                 <a:latin typeface="Century Schoolbook L"/>
               </a:rPr>
-              <a:t>java.lang.OutOfMemoryError: Java heap space !</a:t>
-            </a:r>
-            <a:endParaRPr/>
-          </a:p>
-        </p:txBody>
-      </p:sp>
-      <p:sp>
-        <p:nvSpPr>
-          <p:cNvPr id="84" name="CustomShape 2"/>
+              <a:t>Big Data Cluster Tuning – </a:t>
+            </a:r>
+            <a:r>
+              <a:rPr lang="en-US" sz="2800">
+                <a:latin typeface="Century Schoolbook L"/>
+              </a:rPr>
+              <a:t>OS Parameters</a:t>
+            </a:r>
+            <a:endParaRPr/>
+          </a:p>
+        </p:txBody>
+      </p:sp>
+      <p:sp>
+        <p:nvSpPr>
+          <p:cNvPr id="85" name="CustomShape 2"/>
           <p:cNvSpPr/>
           <p:nvPr/>
         </p:nvSpPr>
         <p:spPr>
           <a:xfrm>
-            <a:off x="503640" y="1984680"/>
-            <a:ext cx="9070200" cy="4383360"/>
+            <a:off x="503640" y="1768680"/>
+            <a:ext cx="9069840" cy="5362200"/>
           </a:xfrm>
           <a:prstGeom prst="rect">
             <a:avLst/>
@@ -5617,146 +5851,123 @@
         <p:txBody>
           <a:bodyPr lIns="0" rIns="0" tIns="0" bIns="0"/>
           <a:p>
-            <a:pPr>
-              <a:lnSpc>
-                <a:spcPct val="100000"/>
-              </a:lnSpc>
-              <a:buSzPct val="45000"/>
-              <a:buFont typeface="StarSymbol"/>
-              <a:buChar char="l"/>
-            </a:pPr>
-            <a:r>
-              <a:rPr lang="en-US">
+            <a:r>
+              <a:rPr lang="en-US" sz="1600">
                 <a:latin typeface="Courier 10 Pitch"/>
               </a:rPr>
-              <a:t>List Ram: free -m</a:t>
-            </a:r>
-            <a:endParaRPr/>
-          </a:p>
-          <a:p>
-            <a:pPr>
-              <a:lnSpc>
-                <a:spcPct val="100000"/>
-              </a:lnSpc>
-              <a:buSzPct val="45000"/>
-              <a:buFont typeface="StarSymbol"/>
-              <a:buChar char="l"/>
-            </a:pPr>
-            <a:r>
-              <a:rPr lang="en-US">
+              <a:t>TPS (Transaction Per Second) - throughput for every Jobs.</a:t>
+            </a:r>
+            <a:endParaRPr/>
+          </a:p>
+          <a:p>
+            <a:endParaRPr/>
+          </a:p>
+          <a:p>
+            <a:r>
+              <a:rPr lang="en-US" sz="1600">
                 <a:latin typeface="Courier 10 Pitch"/>
               </a:rPr>
-              <a:t>Storage: df -h</a:t>
-            </a:r>
-            <a:endParaRPr/>
-          </a:p>
-          <a:p>
-            <a:pPr>
-              <a:lnSpc>
-                <a:spcPct val="100000"/>
-              </a:lnSpc>
-            </a:pPr>
-            <a:endParaRPr/>
-          </a:p>
-          <a:p>
-            <a:pPr>
-              <a:lnSpc>
-                <a:spcPct val="100000"/>
-              </a:lnSpc>
-              <a:buSzPct val="45000"/>
-              <a:buFont typeface="StarSymbol"/>
-              <a:buChar char="l"/>
-            </a:pPr>
-            <a:r>
-              <a:rPr lang="en-US">
+              <a:t>Time Wait Interval - TCP - For ex. 4 min</a:t>
+            </a:r>
+            <a:endParaRPr/>
+          </a:p>
+          <a:p>
+            <a:endParaRPr/>
+          </a:p>
+          <a:p>
+            <a:r>
+              <a:rPr lang="en-US" sz="1600">
                 <a:latin typeface="Courier 10 Pitch"/>
               </a:rPr>
-              <a:t>ulimit -s  // Stack memory</a:t>
-            </a:r>
-            <a:endParaRPr/>
-          </a:p>
-          <a:p>
-            <a:pPr>
-              <a:lnSpc>
-                <a:spcPct val="100000"/>
-              </a:lnSpc>
-              <a:buSzPct val="45000"/>
-              <a:buFont typeface="StarSymbol"/>
-              <a:buChar char="l"/>
-            </a:pPr>
-            <a:r>
-              <a:rPr lang="en-US">
+              <a:t>Max.port</a:t>
+            </a:r>
+            <a:endParaRPr/>
+          </a:p>
+          <a:p>
+            <a:r>
+              <a:rPr lang="en-US" sz="1600">
                 <a:latin typeface="Courier 10 Pitch"/>
               </a:rPr>
-              <a:t>ulimit -v  // Virtual Memory</a:t>
-            </a:r>
-            <a:endParaRPr/>
-          </a:p>
-          <a:p>
-            <a:pPr>
-              <a:lnSpc>
-                <a:spcPct val="100000"/>
-              </a:lnSpc>
-            </a:pPr>
-            <a:endParaRPr/>
-          </a:p>
-          <a:p>
-            <a:pPr>
-              <a:lnSpc>
-                <a:spcPct val="100000"/>
-              </a:lnSpc>
-              <a:buSzPct val="45000"/>
-              <a:buFont typeface="StarSymbol"/>
-              <a:buChar char="l"/>
-            </a:pPr>
-            <a:r>
-              <a:rPr lang="en-US">
+              <a:t>max.connection</a:t>
+            </a:r>
+            <a:endParaRPr/>
+          </a:p>
+          <a:p>
+            <a:endParaRPr/>
+          </a:p>
+          <a:p>
+            <a:r>
+              <a:rPr lang="en-US" sz="1600">
                 <a:latin typeface="Courier 10 Pitch"/>
               </a:rPr>
+              <a:t>sysctl net.ipv4.ip_local_port_range</a:t>
+            </a:r>
+            <a:endParaRPr/>
+          </a:p>
+          <a:p>
+            <a:r>
+              <a:rPr lang="en-US" sz="1600">
+                <a:latin typeface="Courier 10 Pitch"/>
+              </a:rPr>
+              <a:t>sysctl net.ipv4.tcp_fin_timeout</a:t>
+            </a:r>
+            <a:endParaRPr/>
+          </a:p>
+          <a:p>
+            <a:endParaRPr/>
+          </a:p>
+          <a:p>
+            <a:r>
+              <a:rPr lang="en-US" sz="1600">
+                <a:latin typeface="Courier 10 Pitch"/>
+              </a:rPr>
+              <a:t>Max Thread - sysctl -a | grep threads_max</a:t>
+            </a:r>
+            <a:endParaRPr/>
+          </a:p>
+          <a:p>
+            <a:r>
+              <a:rPr lang="en-US" sz="1600">
+                <a:latin typeface="Courier 10 Pitch"/>
+              </a:rPr>
               <a:t>echo 120000 &gt; /proc/sys/kernal/threads_max</a:t>
             </a:r>
             <a:endParaRPr/>
           </a:p>
           <a:p>
-            <a:pPr>
-              <a:lnSpc>
-                <a:spcPct val="100000"/>
-              </a:lnSpc>
-              <a:buSzPct val="45000"/>
-              <a:buFont typeface="StarSymbol"/>
-              <a:buChar char="l"/>
-            </a:pPr>
-            <a:r>
-              <a:rPr lang="en-US">
+            <a:r>
+              <a:rPr lang="en-US" sz="1600">
                 <a:latin typeface="Courier 10 Pitch"/>
               </a:rPr>
-              <a:t>echo 600000 &gt; /proc/sys/kernal/max_map_count</a:t>
-            </a:r>
-            <a:endParaRPr/>
-          </a:p>
-          <a:p>
-            <a:pPr>
-              <a:lnSpc>
-                <a:spcPct val="100000"/>
-              </a:lnSpc>
-              <a:buSzPct val="45000"/>
-              <a:buFont typeface="StarSymbol"/>
-              <a:buChar char="l"/>
-            </a:pPr>
-            <a:r>
-              <a:rPr lang="en-US">
+              <a:t>echo 600000 &gt; /proc/sys</a:t>
+            </a:r>
+            <a:endParaRPr/>
+          </a:p>
+          <a:p>
+            <a:endParaRPr/>
+          </a:p>
+          <a:p>
+            <a:r>
+              <a:rPr lang="en-US" sz="1600">
                 <a:latin typeface="Courier 10 Pitch"/>
               </a:rPr>
-              <a:t>echo 200000 &gt; /proc/sys/kernal/pid_max</a:t>
-            </a:r>
-            <a:endParaRPr/>
-          </a:p>
-          <a:p>
-            <a:pPr>
-              <a:lnSpc>
-                <a:spcPct val="100000"/>
-              </a:lnSpc>
-            </a:pPr>
+              <a:t>cat /proc/sys/kernal/threads_max</a:t>
+            </a:r>
+            <a:endParaRPr/>
+          </a:p>
+          <a:p>
+            <a:endParaRPr/>
+          </a:p>
+          <a:p>
+            <a:r>
+              <a:rPr lang="en-US" sz="1600">
+                <a:latin typeface="Courier 10 Pitch"/>
+              </a:rPr>
+              <a:t>Number of Thread = Total Virtual Memory / (Stacksize * 1024 * 2024)</a:t>
+            </a:r>
+            <a:endParaRPr/>
+          </a:p>
+          <a:p>
             <a:endParaRPr/>
           </a:p>
         </p:txBody>
@@ -5766,10 +5977,10 @@
   <p:timing>
     <p:tnLst>
       <p:par>
-        <p:cTn id="11" dur="indefinite" restart="never" nodeType="tmRoot">
+        <p:cTn id="9" dur="indefinite" restart="never" nodeType="tmRoot">
           <p:childTnLst>
             <p:seq>
-              <p:cTn id="12" nodeType="mainSeq"/>
+              <p:cTn id="10" nodeType="mainSeq"/>
               <p:prevCondLst>
                 <p:cond delay="0" evt="onPrev">
                   <p:tgtEl>
@@ -5812,14 +6023,14 @@
       </p:grpSpPr>
       <p:sp>
         <p:nvSpPr>
-          <p:cNvPr id="85" name="CustomShape 1"/>
+          <p:cNvPr id="86" name="CustomShape 1"/>
           <p:cNvSpPr/>
           <p:nvPr/>
         </p:nvSpPr>
         <p:spPr>
           <a:xfrm>
             <a:off x="503640" y="276480"/>
-            <a:ext cx="9070200" cy="1310400"/>
+            <a:ext cx="9069840" cy="1310040"/>
           </a:xfrm>
           <a:prstGeom prst="rect">
             <a:avLst/>
@@ -5841,34 +6052,22 @@
               <a:rPr lang="en-US" sz="4000">
                 <a:latin typeface="Century Schoolbook L"/>
               </a:rPr>
-              <a:t>Virtual Memory Configuration – </a:t>
-            </a:r>
-            <a:r>
-              <a:rPr lang="en-US" sz="2800">
-                <a:latin typeface="Century Schoolbook L"/>
-              </a:rPr>
-              <a:t>swap configuration</a:t>
-            </a:r>
-            <a:r>
-              <a:rPr lang="en-US" sz="4000">
-                <a:latin typeface="Century Schoolbook L"/>
-              </a:rPr>
-              <a:t> </a:t>
-            </a:r>
-            <a:endParaRPr/>
-          </a:p>
-        </p:txBody>
-      </p:sp>
-      <p:sp>
-        <p:nvSpPr>
-          <p:cNvPr id="86" name="CustomShape 2"/>
+              <a:t>java.lang.OutOfMemoryError: Java heap space !</a:t>
+            </a:r>
+            <a:endParaRPr/>
+          </a:p>
+        </p:txBody>
+      </p:sp>
+      <p:sp>
+        <p:nvSpPr>
+          <p:cNvPr id="87" name="CustomShape 2"/>
           <p:cNvSpPr/>
           <p:nvPr/>
         </p:nvSpPr>
         <p:spPr>
           <a:xfrm>
-            <a:off x="529920" y="2194560"/>
-            <a:ext cx="9070200" cy="4383360"/>
+            <a:off x="503640" y="1984680"/>
+            <a:ext cx="9069840" cy="4383000"/>
           </a:xfrm>
           <a:prstGeom prst="rect">
             <a:avLst/>
@@ -5893,7 +6092,7 @@
               <a:rPr lang="en-US">
                 <a:latin typeface="Courier 10 Pitch"/>
               </a:rPr>
-              <a:t>sudo fallocate -l 20G /swapfile</a:t>
+              <a:t>List Ram: free -m</a:t>
             </a:r>
             <a:endParaRPr/>
           </a:p>
@@ -5910,8 +6109,16 @@
               <a:rPr lang="en-US">
                 <a:latin typeface="Courier 10 Pitch"/>
               </a:rPr>
-              <a:t>sudo chmod 600 /swapfile</a:t>
-            </a:r>
+              <a:t>Storage: df -h</a:t>
+            </a:r>
+            <a:endParaRPr/>
+          </a:p>
+          <a:p>
+            <a:pPr>
+              <a:lnSpc>
+                <a:spcPct val="100000"/>
+              </a:lnSpc>
+            </a:pPr>
             <a:endParaRPr/>
           </a:p>
           <a:p>
@@ -5927,7 +6134,7 @@
               <a:rPr lang="en-US">
                 <a:latin typeface="Courier 10 Pitch"/>
               </a:rPr>
-              <a:t>sudo mkswap /swapfile</a:t>
+              <a:t>ulimit -s  // Stack memory</a:t>
             </a:r>
             <a:endParaRPr/>
           </a:p>
@@ -5944,8 +6151,16 @@
               <a:rPr lang="en-US">
                 <a:latin typeface="Courier 10 Pitch"/>
               </a:rPr>
-              <a:t>sudo swapon /swapfile</a:t>
-            </a:r>
+              <a:t>ulimit -v  // Virtual Memory</a:t>
+            </a:r>
+            <a:endParaRPr/>
+          </a:p>
+          <a:p>
+            <a:pPr>
+              <a:lnSpc>
+                <a:spcPct val="100000"/>
+              </a:lnSpc>
+            </a:pPr>
             <a:endParaRPr/>
           </a:p>
           <a:p>
@@ -5961,7 +6176,7 @@
               <a:rPr lang="en-US">
                 <a:latin typeface="Courier 10 Pitch"/>
               </a:rPr>
-              <a:t>sudo swapon -s</a:t>
+              <a:t>echo 120000 &gt; /proc/sys/kernal/threads_max</a:t>
             </a:r>
             <a:endParaRPr/>
           </a:p>
@@ -5978,7 +6193,7 @@
               <a:rPr lang="en-US">
                 <a:latin typeface="Courier 10 Pitch"/>
               </a:rPr>
-              <a:t>sudo nano /etc/fstab</a:t>
+              <a:t>echo 600000 &gt; /proc/sys/kernal/max_map_count</a:t>
             </a:r>
             <a:endParaRPr/>
           </a:p>
@@ -5995,7 +6210,7 @@
               <a:rPr lang="en-US">
                 <a:latin typeface="Courier 10 Pitch"/>
               </a:rPr>
-              <a:t>/swapfile   none    swap    sw    0   0</a:t>
+              <a:t>echo 200000 &gt; /proc/sys/kernal/pid_max</a:t>
             </a:r>
             <a:endParaRPr/>
           </a:p>
@@ -6014,10 +6229,10 @@
   <p:timing>
     <p:tnLst>
       <p:par>
-        <p:cTn id="13" dur="indefinite" restart="never" nodeType="tmRoot">
+        <p:cTn id="11" dur="indefinite" restart="never" nodeType="tmRoot">
           <p:childTnLst>
             <p:seq>
-              <p:cTn id="14" nodeType="mainSeq"/>
+              <p:cTn id="12" nodeType="mainSeq"/>
               <p:prevCondLst>
                 <p:cond delay="0" evt="onPrev">
                   <p:tgtEl>
@@ -6060,14 +6275,14 @@
       </p:grpSpPr>
       <p:sp>
         <p:nvSpPr>
-          <p:cNvPr id="87" name="CustomShape 1"/>
+          <p:cNvPr id="88" name="CustomShape 1"/>
           <p:cNvSpPr/>
           <p:nvPr/>
         </p:nvSpPr>
         <p:spPr>
           <a:xfrm>
-            <a:off x="503640" y="301320"/>
-            <a:ext cx="9070200" cy="1260720"/>
+            <a:off x="503640" y="276480"/>
+            <a:ext cx="9069840" cy="1310040"/>
           </a:xfrm>
           <a:prstGeom prst="rect">
             <a:avLst/>
@@ -6089,22 +6304,34 @@
               <a:rPr lang="en-US" sz="4000">
                 <a:latin typeface="Century Schoolbook L"/>
               </a:rPr>
-              <a:t>Maximum number of open files</a:t>
-            </a:r>
-            <a:endParaRPr/>
-          </a:p>
-        </p:txBody>
-      </p:sp>
-      <p:sp>
-        <p:nvSpPr>
-          <p:cNvPr id="88" name="CustomShape 2"/>
+              <a:t>Virtual Memory Configuration – </a:t>
+            </a:r>
+            <a:r>
+              <a:rPr lang="en-US" sz="2800">
+                <a:latin typeface="Century Schoolbook L"/>
+              </a:rPr>
+              <a:t>swap configuration</a:t>
+            </a:r>
+            <a:r>
+              <a:rPr lang="en-US" sz="4000">
+                <a:latin typeface="Century Schoolbook L"/>
+              </a:rPr>
+              <a:t> </a:t>
+            </a:r>
+            <a:endParaRPr/>
+          </a:p>
+        </p:txBody>
+      </p:sp>
+      <p:sp>
+        <p:nvSpPr>
+          <p:cNvPr id="89" name="CustomShape 2"/>
           <p:cNvSpPr/>
           <p:nvPr/>
         </p:nvSpPr>
         <p:spPr>
           <a:xfrm>
-            <a:off x="503640" y="1768680"/>
-            <a:ext cx="9070200" cy="4383360"/>
+            <a:off x="529920" y="2194560"/>
+            <a:ext cx="9069840" cy="4383000"/>
           </a:xfrm>
           <a:prstGeom prst="rect">
             <a:avLst/>
@@ -6129,16 +6356,8 @@
               <a:rPr lang="en-US">
                 <a:latin typeface="Courier 10 Pitch"/>
               </a:rPr>
-              <a:t>ulimit -n</a:t>
-            </a:r>
-            <a:endParaRPr/>
-          </a:p>
-          <a:p>
-            <a:pPr>
-              <a:lnSpc>
-                <a:spcPct val="100000"/>
-              </a:lnSpc>
-            </a:pPr>
+              <a:t>sudo fallocate -l 20G /swapfile</a:t>
+            </a:r>
             <a:endParaRPr/>
           </a:p>
           <a:p>
@@ -6154,7 +6373,7 @@
               <a:rPr lang="en-US">
                 <a:latin typeface="Courier 10 Pitch"/>
               </a:rPr>
-              <a:t>sudo nano /etc/security/limits.conf</a:t>
+              <a:t>sudo chmod 600 /swapfile</a:t>
             </a:r>
             <a:endParaRPr/>
           </a:p>
@@ -6171,7 +6390,7 @@
               <a:rPr lang="en-US">
                 <a:latin typeface="Courier 10 Pitch"/>
               </a:rPr>
-              <a:t>*    soft nofile 64000</a:t>
+              <a:t>sudo mkswap /swapfile</a:t>
             </a:r>
             <a:endParaRPr/>
           </a:p>
@@ -6188,7 +6407,7 @@
               <a:rPr lang="en-US">
                 <a:latin typeface="Courier 10 Pitch"/>
               </a:rPr>
-              <a:t>*    hard nofile 64000</a:t>
+              <a:t>sudo swapon /swapfile</a:t>
             </a:r>
             <a:endParaRPr/>
           </a:p>
@@ -6205,7 +6424,7 @@
               <a:rPr lang="en-US">
                 <a:latin typeface="Courier 10 Pitch"/>
               </a:rPr>
-              <a:t>root soft nofile 64000</a:t>
+              <a:t>sudo swapon -s</a:t>
             </a:r>
             <a:endParaRPr/>
           </a:p>
@@ -6222,16 +6441,8 @@
               <a:rPr lang="en-US">
                 <a:latin typeface="Courier 10 Pitch"/>
               </a:rPr>
-              <a:t>root hard nofile 64000</a:t>
-            </a:r>
-            <a:endParaRPr/>
-          </a:p>
-          <a:p>
-            <a:pPr>
-              <a:lnSpc>
-                <a:spcPct val="100000"/>
-              </a:lnSpc>
-            </a:pPr>
+              <a:t>sudo nano /etc/fstab</a:t>
+            </a:r>
             <a:endParaRPr/>
           </a:p>
           <a:p>
@@ -6247,58 +6458,7 @@
               <a:rPr lang="en-US">
                 <a:latin typeface="Courier 10 Pitch"/>
               </a:rPr>
-              <a:t>sudo nano /etc/pam.d/common-session</a:t>
-            </a:r>
-            <a:endParaRPr/>
-          </a:p>
-          <a:p>
-            <a:pPr>
-              <a:lnSpc>
-                <a:spcPct val="100000"/>
-              </a:lnSpc>
-              <a:buSzPct val="45000"/>
-              <a:buFont typeface="StarSymbol"/>
-              <a:buChar char="l"/>
-            </a:pPr>
-            <a:r>
-              <a:rPr lang="en-US">
-                <a:latin typeface="Courier 10 Pitch"/>
-              </a:rPr>
-              <a:t>session required        pam_limits.so</a:t>
-            </a:r>
-            <a:endParaRPr/>
-          </a:p>
-          <a:p>
-            <a:pPr>
-              <a:lnSpc>
-                <a:spcPct val="100000"/>
-              </a:lnSpc>
-              <a:buSzPct val="45000"/>
-              <a:buFont typeface="StarSymbol"/>
-              <a:buChar char="l"/>
-            </a:pPr>
-            <a:r>
-              <a:rPr lang="en-US">
-                <a:latin typeface="Courier 10 Pitch"/>
-              </a:rPr>
-              <a:t>sudo nano /etc/pam.d/common-session-noninteractive</a:t>
-            </a:r>
-            <a:endParaRPr/>
-          </a:p>
-          <a:p>
-            <a:pPr>
-              <a:lnSpc>
-                <a:spcPct val="100000"/>
-              </a:lnSpc>
-              <a:buSzPct val="45000"/>
-              <a:buFont typeface="StarSymbol"/>
-              <a:buChar char="l"/>
-            </a:pPr>
-            <a:r>
-              <a:rPr lang="en-US">
-                <a:latin typeface="Courier 10 Pitch"/>
-              </a:rPr>
-              <a:t>session required        pam_limits.so</a:t>
+              <a:t>/swapfile   none    swap    sw    0   0</a:t>
             </a:r>
             <a:endParaRPr/>
           </a:p>
@@ -6317,10 +6477,10 @@
   <p:timing>
     <p:tnLst>
       <p:par>
-        <p:cTn id="15" dur="indefinite" restart="never" nodeType="tmRoot">
+        <p:cTn id="13" dur="indefinite" restart="never" nodeType="tmRoot">
           <p:childTnLst>
             <p:seq>
-              <p:cTn id="16" nodeType="mainSeq"/>
+              <p:cTn id="14" nodeType="mainSeq"/>
               <p:prevCondLst>
                 <p:cond delay="0" evt="onPrev">
                   <p:tgtEl>
@@ -6363,14 +6523,14 @@
       </p:grpSpPr>
       <p:sp>
         <p:nvSpPr>
-          <p:cNvPr id="89" name="CustomShape 1"/>
+          <p:cNvPr id="90" name="CustomShape 1"/>
           <p:cNvSpPr/>
           <p:nvPr/>
         </p:nvSpPr>
         <p:spPr>
           <a:xfrm>
             <a:off x="503640" y="301320"/>
-            <a:ext cx="9070200" cy="1260720"/>
+            <a:ext cx="9069840" cy="1260360"/>
           </a:xfrm>
           <a:prstGeom prst="rect">
             <a:avLst/>
@@ -6392,28 +6552,22 @@
               <a:rPr lang="en-US" sz="4000">
                 <a:latin typeface="Century Schoolbook L"/>
               </a:rPr>
-              <a:t>Big Data Optimization: </a:t>
-            </a:r>
-            <a:r>
-              <a:rPr lang="en-US" sz="2800">
-                <a:latin typeface="Century Schoolbook L"/>
-              </a:rPr>
-              <a:t>Tune kafka Cluster</a:t>
-            </a:r>
-            <a:endParaRPr/>
-          </a:p>
-        </p:txBody>
-      </p:sp>
-      <p:sp>
-        <p:nvSpPr>
-          <p:cNvPr id="90" name="CustomShape 2"/>
+              <a:t>Maximum number of open files</a:t>
+            </a:r>
+            <a:endParaRPr/>
+          </a:p>
+        </p:txBody>
+      </p:sp>
+      <p:sp>
+        <p:nvSpPr>
+          <p:cNvPr id="91" name="CustomShape 2"/>
           <p:cNvSpPr/>
           <p:nvPr/>
         </p:nvSpPr>
         <p:spPr>
           <a:xfrm>
             <a:off x="503640" y="1768680"/>
-            <a:ext cx="9070200" cy="4383360"/>
+            <a:ext cx="9069840" cy="4383000"/>
           </a:xfrm>
           <a:prstGeom prst="rect">
             <a:avLst/>
@@ -6435,240 +6589,179 @@
               <a:buChar char="l"/>
             </a:pPr>
             <a:r>
-              <a:rPr lang="en-US" sz="2000">
+              <a:rPr lang="en-US">
                 <a:latin typeface="Courier 10 Pitch"/>
               </a:rPr>
-              <a:t>buffer.memory: default</a:t>
-            </a:r>
-            <a:endParaRPr/>
-          </a:p>
-          <a:p>
-            <a:pPr>
-              <a:lnSpc>
-                <a:spcPct val="100000"/>
-              </a:lnSpc>
-              <a:buSzPct val="45000"/>
-              <a:buFont typeface="StarSymbol"/>
-              <a:buChar char="l"/>
-            </a:pPr>
-            <a:r>
-              <a:rPr lang="en-US" sz="2000">
+              <a:t>ulimit -n</a:t>
+            </a:r>
+            <a:endParaRPr/>
+          </a:p>
+          <a:p>
+            <a:pPr>
+              <a:lnSpc>
+                <a:spcPct val="100000"/>
+              </a:lnSpc>
+            </a:pPr>
+            <a:endParaRPr/>
+          </a:p>
+          <a:p>
+            <a:pPr>
+              <a:lnSpc>
+                <a:spcPct val="100000"/>
+              </a:lnSpc>
+              <a:buSzPct val="45000"/>
+              <a:buFont typeface="StarSymbol"/>
+              <a:buChar char="l"/>
+            </a:pPr>
+            <a:r>
+              <a:rPr lang="en-US">
                 <a:latin typeface="Courier 10 Pitch"/>
               </a:rPr>
-              <a:t>batch.size: "655357"</a:t>
-            </a:r>
-            <a:endParaRPr/>
-          </a:p>
-          <a:p>
-            <a:pPr>
-              <a:lnSpc>
-                <a:spcPct val="100000"/>
-              </a:lnSpc>
-              <a:buSzPct val="45000"/>
-              <a:buFont typeface="StarSymbol"/>
-              <a:buChar char="l"/>
-            </a:pPr>
-            <a:r>
-              <a:rPr lang="en-US" sz="2000">
+              <a:t>sudo nano /etc/security/limits.conf</a:t>
+            </a:r>
+            <a:endParaRPr/>
+          </a:p>
+          <a:p>
+            <a:pPr>
+              <a:lnSpc>
+                <a:spcPct val="100000"/>
+              </a:lnSpc>
+              <a:buSzPct val="45000"/>
+              <a:buFont typeface="StarSymbol"/>
+              <a:buChar char="l"/>
+            </a:pPr>
+            <a:r>
+              <a:rPr lang="en-US">
                 <a:latin typeface="Courier 10 Pitch"/>
               </a:rPr>
-              <a:t>linger.ms: "5"</a:t>
-            </a:r>
-            <a:endParaRPr/>
-          </a:p>
-          <a:p>
-            <a:pPr>
-              <a:lnSpc>
-                <a:spcPct val="100000"/>
-              </a:lnSpc>
-              <a:buSzPct val="45000"/>
-              <a:buFont typeface="StarSymbol"/>
-              <a:buChar char="l"/>
-            </a:pPr>
-            <a:r>
-              <a:rPr lang="en-US" sz="2000">
+              <a:t>*    soft nofile 64000</a:t>
+            </a:r>
+            <a:endParaRPr/>
+          </a:p>
+          <a:p>
+            <a:pPr>
+              <a:lnSpc>
+                <a:spcPct val="100000"/>
+              </a:lnSpc>
+              <a:buSzPct val="45000"/>
+              <a:buFont typeface="StarSymbol"/>
+              <a:buChar char="l"/>
+            </a:pPr>
+            <a:r>
+              <a:rPr lang="en-US">
                 <a:latin typeface="Courier 10 Pitch"/>
               </a:rPr>
-              <a:t>compression.type: lz4</a:t>
-            </a:r>
-            <a:endParaRPr/>
-          </a:p>
-          <a:p>
-            <a:pPr>
-              <a:lnSpc>
-                <a:spcPct val="100000"/>
-              </a:lnSpc>
-              <a:buSzPct val="45000"/>
-              <a:buFont typeface="StarSymbol"/>
-              <a:buChar char="l"/>
-            </a:pPr>
-            <a:r>
-              <a:rPr lang="en-US" sz="2000">
+              <a:t>*    hard nofile 64000</a:t>
+            </a:r>
+            <a:endParaRPr/>
+          </a:p>
+          <a:p>
+            <a:pPr>
+              <a:lnSpc>
+                <a:spcPct val="100000"/>
+              </a:lnSpc>
+              <a:buSzPct val="45000"/>
+              <a:buFont typeface="StarSymbol"/>
+              <a:buChar char="l"/>
+            </a:pPr>
+            <a:r>
+              <a:rPr lang="en-US">
                 <a:latin typeface="Courier 10 Pitch"/>
               </a:rPr>
-              <a:t>retries: default</a:t>
-            </a:r>
-            <a:endParaRPr/>
-          </a:p>
-          <a:p>
-            <a:pPr>
-              <a:lnSpc>
-                <a:spcPct val="100000"/>
-              </a:lnSpc>
-              <a:buSzPct val="45000"/>
-              <a:buFont typeface="StarSymbol"/>
-              <a:buChar char="l"/>
-            </a:pPr>
-            <a:r>
-              <a:rPr lang="en-US" sz="2000">
+              <a:t>root soft nofile 64000</a:t>
+            </a:r>
+            <a:endParaRPr/>
+          </a:p>
+          <a:p>
+            <a:pPr>
+              <a:lnSpc>
+                <a:spcPct val="100000"/>
+              </a:lnSpc>
+              <a:buSzPct val="45000"/>
+              <a:buFont typeface="StarSymbol"/>
+              <a:buChar char="l"/>
+            </a:pPr>
+            <a:r>
+              <a:rPr lang="en-US">
                 <a:latin typeface="Courier 10 Pitch"/>
               </a:rPr>
-              <a:t>send.buffer.bytes: default</a:t>
-            </a:r>
-            <a:endParaRPr/>
-          </a:p>
-          <a:p>
-            <a:pPr>
-              <a:lnSpc>
-                <a:spcPct val="100000"/>
-              </a:lnSpc>
-              <a:buSzPct val="45000"/>
-              <a:buFont typeface="StarSymbol"/>
-              <a:buChar char="l"/>
-            </a:pPr>
-            <a:r>
-              <a:rPr lang="en-US" sz="2000">
+              <a:t>root hard nofile 64000</a:t>
+            </a:r>
+            <a:endParaRPr/>
+          </a:p>
+          <a:p>
+            <a:pPr>
+              <a:lnSpc>
+                <a:spcPct val="100000"/>
+              </a:lnSpc>
+            </a:pPr>
+            <a:endParaRPr/>
+          </a:p>
+          <a:p>
+            <a:pPr>
+              <a:lnSpc>
+                <a:spcPct val="100000"/>
+              </a:lnSpc>
+              <a:buSzPct val="45000"/>
+              <a:buFont typeface="StarSymbol"/>
+              <a:buChar char="l"/>
+            </a:pPr>
+            <a:r>
+              <a:rPr lang="en-US">
                 <a:latin typeface="Courier 10 Pitch"/>
               </a:rPr>
-              <a:t>connections.max.idle.ms: default</a:t>
-            </a:r>
-            <a:endParaRPr/>
-          </a:p>
-          <a:p>
-            <a:pPr>
-              <a:lnSpc>
-                <a:spcPct val="100000"/>
-              </a:lnSpc>
-            </a:pPr>
-            <a:endParaRPr/>
-          </a:p>
-          <a:p>
-            <a:pPr>
-              <a:lnSpc>
-                <a:spcPct val="100000"/>
-              </a:lnSpc>
-              <a:buSzPct val="45000"/>
-              <a:buFont typeface="StarSymbol"/>
-              <a:buChar char="l"/>
-            </a:pPr>
-            <a:r>
-              <a:rPr lang="en-US" sz="2000">
-                <a:solidFill>
-                  <a:srgbClr val="3333ff"/>
-                </a:solidFill>
+              <a:t>sudo nano /etc/pam.d/common-session</a:t>
+            </a:r>
+            <a:endParaRPr/>
+          </a:p>
+          <a:p>
+            <a:pPr>
+              <a:lnSpc>
+                <a:spcPct val="100000"/>
+              </a:lnSpc>
+              <a:buSzPct val="45000"/>
+              <a:buFont typeface="StarSymbol"/>
+              <a:buChar char="l"/>
+            </a:pPr>
+            <a:r>
+              <a:rPr lang="en-US">
                 <a:latin typeface="Courier 10 Pitch"/>
               </a:rPr>
-              <a:t>bootstrap.servers</a:t>
-            </a:r>
-            <a:endParaRPr/>
-          </a:p>
-          <a:p>
-            <a:pPr>
-              <a:lnSpc>
-                <a:spcPct val="100000"/>
-              </a:lnSpc>
-              <a:buSzPct val="45000"/>
-              <a:buFont typeface="StarSymbol"/>
-              <a:buChar char="l"/>
-            </a:pPr>
-            <a:r>
-              <a:rPr lang="en-US" sz="2000">
-                <a:solidFill>
-                  <a:srgbClr val="3333ff"/>
-                </a:solidFill>
+              <a:t>session required        pam_limits.so</a:t>
+            </a:r>
+            <a:endParaRPr/>
+          </a:p>
+          <a:p>
+            <a:pPr>
+              <a:lnSpc>
+                <a:spcPct val="100000"/>
+              </a:lnSpc>
+              <a:buSzPct val="45000"/>
+              <a:buFont typeface="StarSymbol"/>
+              <a:buChar char="l"/>
+            </a:pPr>
+            <a:r>
+              <a:rPr lang="en-US">
                 <a:latin typeface="Courier 10 Pitch"/>
               </a:rPr>
-              <a:t>batch.size</a:t>
-            </a:r>
-            <a:endParaRPr/>
-          </a:p>
-          <a:p>
-            <a:pPr>
-              <a:lnSpc>
-                <a:spcPct val="100000"/>
-              </a:lnSpc>
-              <a:buSzPct val="45000"/>
-              <a:buFont typeface="StarSymbol"/>
-              <a:buChar char="l"/>
-            </a:pPr>
-            <a:r>
-              <a:rPr lang="en-US" sz="2000">
-                <a:solidFill>
-                  <a:srgbClr val="3333ff"/>
-                </a:solidFill>
+              <a:t>sudo nano /etc/pam.d/common-session-noninteractive</a:t>
+            </a:r>
+            <a:endParaRPr/>
+          </a:p>
+          <a:p>
+            <a:pPr>
+              <a:lnSpc>
+                <a:spcPct val="100000"/>
+              </a:lnSpc>
+              <a:buSzPct val="45000"/>
+              <a:buFont typeface="StarSymbol"/>
+              <a:buChar char="l"/>
+            </a:pPr>
+            <a:r>
+              <a:rPr lang="en-US">
                 <a:latin typeface="Courier 10 Pitch"/>
               </a:rPr>
-              <a:t>linger.ms</a:t>
-            </a:r>
-            <a:endParaRPr/>
-          </a:p>
-          <a:p>
-            <a:pPr>
-              <a:lnSpc>
-                <a:spcPct val="100000"/>
-              </a:lnSpc>
-              <a:buSzPct val="45000"/>
-              <a:buFont typeface="StarSymbol"/>
-              <a:buChar char="l"/>
-            </a:pPr>
-            <a:r>
-              <a:rPr lang="en-US" sz="2000">
-                <a:solidFill>
-                  <a:srgbClr val="3333ff"/>
-                </a:solidFill>
-                <a:latin typeface="Courier 10 Pitch"/>
-              </a:rPr>
-              <a:t>connections.max.idle.ms = 10000</a:t>
-            </a:r>
-            <a:endParaRPr/>
-          </a:p>
-          <a:p>
-            <a:pPr>
-              <a:lnSpc>
-                <a:spcPct val="100000"/>
-              </a:lnSpc>
-              <a:buSzPct val="45000"/>
-              <a:buFont typeface="StarSymbol"/>
-              <a:buChar char="l"/>
-            </a:pPr>
-            <a:r>
-              <a:rPr lang="en-US" sz="2000">
-                <a:solidFill>
-                  <a:srgbClr val="3333ff"/>
-                </a:solidFill>
-                <a:latin typeface="Courier 10 Pitch"/>
-              </a:rPr>
-              <a:t>compression.type</a:t>
-            </a:r>
-            <a:endParaRPr/>
-          </a:p>
-          <a:p>
-            <a:pPr>
-              <a:lnSpc>
-                <a:spcPct val="100000"/>
-              </a:lnSpc>
-              <a:buSzPct val="45000"/>
-              <a:buFont typeface="StarSymbol"/>
-              <a:buChar char="l"/>
-            </a:pPr>
-            <a:r>
-              <a:rPr lang="en-US" sz="2000">
-                <a:solidFill>
-                  <a:srgbClr val="3333ff"/>
-                </a:solidFill>
-                <a:latin typeface="Courier 10 Pitch"/>
-              </a:rPr>
-              <a:t>retries</a:t>
+              <a:t>session required        pam_limits.so</a:t>
             </a:r>
             <a:endParaRPr/>
           </a:p>
@@ -6687,10 +6780,10 @@
   <p:timing>
     <p:tnLst>
       <p:par>
-        <p:cTn id="17" dur="indefinite" restart="never" nodeType="tmRoot">
+        <p:cTn id="15" dur="indefinite" restart="never" nodeType="tmRoot">
           <p:childTnLst>
             <p:seq>
-              <p:cTn id="18" nodeType="mainSeq"/>
+              <p:cTn id="16" nodeType="mainSeq"/>
               <p:prevCondLst>
                 <p:cond delay="0" evt="onPrev">
                   <p:tgtEl>

</xml_diff>